<commit_message>
Live Lecture 18 updates
</commit_message>
<xml_diff>
--- a/lectures/lecture-18/Lecture-Live A00/Lecture 18 - Lecture.pptx
+++ b/lectures/lecture-18/Lecture-Live A00/Lecture 18 - Lecture.pptx
@@ -144,6 +144,678 @@
     </p:ext>
   </p:extLst>
 </p:presentation>
+</file>
+
+<file path=ppt/ink/ink1.xml><?xml version="1.0" encoding="utf-8"?>
+<inkml:ink xmlns:inkml="http://www.w3.org/2003/InkML">
+  <inkml:definitions>
+    <inkml:context xml:id="ctx0">
+      <inkml:inkSource xml:id="inkSrc0">
+        <inkml:traceFormat>
+          <inkml:channel name="X" type="integer" min="-2.14748E9" max="2.14748E9" units="cm"/>
+          <inkml:channel name="Y" type="integer" min="-2.14748E9" max="2.14748E9" units="cm"/>
+          <inkml:channel name="F" type="integer" max="32767" units="dev"/>
+          <inkml:channel name="OA" type="integer" max="360" units="deg"/>
+          <inkml:channel name="OE" type="integer" max="90" units="deg"/>
+        </inkml:traceFormat>
+        <inkml:channelProperties>
+          <inkml:channelProperty channel="X" name="resolution" value="1000" units="1/cm"/>
+          <inkml:channelProperty channel="Y" name="resolution" value="1000" units="1/cm"/>
+          <inkml:channelProperty channel="F" name="resolution" value="0" units="1/dev"/>
+          <inkml:channelProperty channel="OA" name="resolution" value="1000" units="1/deg"/>
+          <inkml:channelProperty channel="OE" name="resolution" value="1000" units="1/deg"/>
+        </inkml:channelProperties>
+      </inkml:inkSource>
+      <inkml:timestamp xml:id="ts0" timeString="2020-11-16T17:00:44.355"/>
+    </inkml:context>
+    <inkml:brush xml:id="br0">
+      <inkml:brushProperty name="width" value="0.05" units="cm"/>
+      <inkml:brushProperty name="height" value="0.05" units="cm"/>
+      <inkml:brushProperty name="color" value="#004F8B"/>
+    </inkml:brush>
+  </inkml:definitions>
+  <inkml:trace contextRef="#ctx0" brushRef="#br0">1 43 6824 0 0,'0'0'4230'0'0,"9"-18"-1460"0"0,13-1-597 0 0,-22 19-1563 0 0,2-3-203 0 0,-2 3-359 0 0,0 0-1 0 0,0 0 1 0 0,0 0 0 0 0,0 0 0 0 0,1 0 0 0 0,-1-1 0 0 0,0 1 0 0 0,0 0-1 0 0,0 0 1 0 0,0 0 0 0 0,0 0 0 0 0,0 0 0 0 0,0 0 0 0 0,0 0-1 0 0,0-1 1 0 0,1 1 0 0 0,-1 0 0 0 0,0 0 0 0 0,0 0 0 0 0,0 0-1 0 0,0 0 1 0 0,0 0 0 0 0,0 0 0 0 0,1 0 0 0 0,-1 0 0 0 0,0 0-1 0 0,0 0 1 0 0,0 0 0 0 0,0 0 0 0 0,0 0 0 0 0,1 0 0 0 0,-1 0-1 0 0,0 0 1 0 0,0 0 0 0 0,0 0 0 0 0,0 0 0 0 0,0 0 0 0 0,1 0-1 0 0,3 2 50 0 0,0-1 73 0 0,0 0 1 0 0,0 1-1 0 0,-1-1 0 0 0,1 1 0 0 0,-1 0 0 0 0,5 3 0 0 0,-7-4 152 0 0,12 7 224 0 0,-7-5-334 0 0,0 1 0 0 0,0-1-1 0 0,0 0 1 0 0,1 0-1 0 0,-1 0 1 0 0,10 1-1 0 0,3 3 159 0 0,-10-5-245 0 0,0 0-1 0 0,1-1 1 0 0,-1 0-1 0 0,0 0 1 0 0,0-1-1 0 0,15-2 1 0 0,21 1 212 0 0,-22 2-284 0 0,36-5 1 0 0,-21 1 6 0 0,14-1 90 0 0,-30 1-101 0 0,1 1 1 0 0,-1 2-1 0 0,40 3 1 0 0,-39-1 88 0 0,0-1 0 0 0,37-3 1 0 0,17 1-58 0 0,-26 3-70 0 0,-20-2 111 0 0,-1 2-1 0 0,0 1 1 0 0,42 10-1 0 0,-45-7 33 0 0,-1-1-1 0 0,50 2 0 0 0,-56-6-101 0 0,-6 1-22 0 0,26-3 0 0 0,-7 0 5 0 0,46 4 0 0 0,-50-2 2 0 0,50 7 135 0 0,-50-4-245 0 0,0-2 0 0 0,45-1 0 0 0,19 1 197 0 0,67-6 61 0 0,-24 2-23 0 0,-109 0-108 0 0,148 0 449 0 0,-91 1 21 0 0,-32 0-112 0 0,-38 0-412 0 0,-1 0 0 0 0,1-1 0 0 0,13-3-1 0 0,2-1 95 0 0,-21 6-30 0 0,-5 0-8 0 0,9-2 128 0 0</inkml:trace>
+</inkml:ink>
+</file>
+
+<file path=ppt/ink/ink10.xml><?xml version="1.0" encoding="utf-8"?>
+<inkml:ink xmlns:inkml="http://www.w3.org/2003/InkML">
+  <inkml:definitions>
+    <inkml:context xml:id="ctx0">
+      <inkml:inkSource xml:id="inkSrc0">
+        <inkml:traceFormat>
+          <inkml:channel name="X" type="integer" min="-2.14748E9" max="2.14748E9" units="cm"/>
+          <inkml:channel name="Y" type="integer" min="-2.14748E9" max="2.14748E9" units="cm"/>
+          <inkml:channel name="F" type="integer" max="32767" units="dev"/>
+          <inkml:channel name="OA" type="integer" max="360" units="deg"/>
+          <inkml:channel name="OE" type="integer" max="90" units="deg"/>
+        </inkml:traceFormat>
+        <inkml:channelProperties>
+          <inkml:channelProperty channel="X" name="resolution" value="1000" units="1/cm"/>
+          <inkml:channelProperty channel="Y" name="resolution" value="1000" units="1/cm"/>
+          <inkml:channelProperty channel="F" name="resolution" value="0" units="1/dev"/>
+          <inkml:channelProperty channel="OA" name="resolution" value="1000" units="1/deg"/>
+          <inkml:channelProperty channel="OE" name="resolution" value="1000" units="1/deg"/>
+        </inkml:channelProperties>
+      </inkml:inkSource>
+      <inkml:timestamp xml:id="ts0" timeString="2020-11-16T17:01:04.919"/>
+    </inkml:context>
+    <inkml:brush xml:id="br0">
+      <inkml:brushProperty name="width" value="0.05" units="cm"/>
+      <inkml:brushProperty name="height" value="0.05" units="cm"/>
+      <inkml:brushProperty name="color" value="#004F8B"/>
+    </inkml:brush>
+  </inkml:definitions>
+  <inkml:trace contextRef="#ctx0" brushRef="#br0">34 9 7368 0 0,'0'0'55'0'0,"0"0"1"0"0,0 1 0 0 0,-1-1 0 0 0,1 0-1 0 0,0 0 1 0 0,0 0 0 0 0,0 0-1 0 0,0 0 1 0 0,0 0 0 0 0,-1 0-1 0 0,1 0 1 0 0,0 0 0 0 0,0 0-1 0 0,0 0 1 0 0,0-1 0 0 0,0 1-1 0 0,-1 0 1 0 0,1 0 0 0 0,0 0-1 0 0,0 0 1 0 0,0 0 0 0 0,0 0 0 0 0,0 0-1 0 0,0 0 1 0 0,0 0 0 0 0,0-9 7574 0 0,-3 17-3829 0 0,-3 21-3512 0 0,3-13 34 0 0,2-7-272 0 0,-14 79 378 0 0,14-79-409 0 0,0 1 0 0 0,1 0 0 0 0,0 0 0 0 0,1 0 0 0 0,0 0 0 0 0,5 18 0 0 0,-5-25-18 0 0,0 0-1 0 0,0 1 1 0 0,0-1-1 0 0,1 0 1 0 0,-1 0-1 0 0,1 0 1 0 0,0 0-1 0 0,3 4 1 0 0,-4-7 12 0 0,0 1 0 0 0,-1 0 0 0 0,1-1 1 0 0,0 1-1 0 0,0-1 0 0 0,0 1 0 0 0,0-1 0 0 0,-1 1 0 0 0,1-1 0 0 0,0 0 0 0 0,0 1 1 0 0,0-1-1 0 0,0 0 0 0 0,0 0 0 0 0,0 0 0 0 0,0 0 0 0 0,0 0 0 0 0,0 0 0 0 0,0 0 1 0 0,0 0-1 0 0,0 0 0 0 0,0 0 0 0 0,0 0 0 0 0,0-1 0 0 0,0 1 0 0 0,0 0 1 0 0,0-1-1 0 0,0 1 0 0 0,0-1 0 0 0,0 1 0 0 0,-1-1 0 0 0,2 0 0 0 0,6-4 85 0 0,-1-1-1 0 0,-1 1 0 0 0,1-1 1 0 0,-1-1-1 0 0,0 1 0 0 0,0-1 1 0 0,6-10-1 0 0,30-57 451 0 0,-32 55-361 0 0,26-66 1560 0 0,-32 77-592 0 0,-8 23-829 0 0,-8 42-241 0 0,7-37-111 0 0,1 0 1 0 0,-2 41-1 0 0,6-59-686 0 0</inkml:trace>
+</inkml:ink>
+</file>
+
+<file path=ppt/ink/ink11.xml><?xml version="1.0" encoding="utf-8"?>
+<inkml:ink xmlns:inkml="http://www.w3.org/2003/InkML">
+  <inkml:definitions>
+    <inkml:context xml:id="ctx0">
+      <inkml:inkSource xml:id="inkSrc0">
+        <inkml:traceFormat>
+          <inkml:channel name="X" type="integer" min="-2.14748E9" max="2.14748E9" units="cm"/>
+          <inkml:channel name="Y" type="integer" min="-2.14748E9" max="2.14748E9" units="cm"/>
+          <inkml:channel name="F" type="integer" max="32767" units="dev"/>
+          <inkml:channel name="OA" type="integer" max="360" units="deg"/>
+          <inkml:channel name="OE" type="integer" max="90" units="deg"/>
+        </inkml:traceFormat>
+        <inkml:channelProperties>
+          <inkml:channelProperty channel="X" name="resolution" value="1000" units="1/cm"/>
+          <inkml:channelProperty channel="Y" name="resolution" value="1000" units="1/cm"/>
+          <inkml:channelProperty channel="F" name="resolution" value="0" units="1/dev"/>
+          <inkml:channelProperty channel="OA" name="resolution" value="1000" units="1/deg"/>
+          <inkml:channelProperty channel="OE" name="resolution" value="1000" units="1/deg"/>
+        </inkml:channelProperties>
+      </inkml:inkSource>
+      <inkml:timestamp xml:id="ts0" timeString="2020-11-16T17:01:05.265"/>
+    </inkml:context>
+    <inkml:brush xml:id="br0">
+      <inkml:brushProperty name="width" value="0.05" units="cm"/>
+      <inkml:brushProperty name="height" value="0.05" units="cm"/>
+      <inkml:brushProperty name="color" value="#004F8B"/>
+    </inkml:brush>
+  </inkml:definitions>
+  <inkml:trace contextRef="#ctx0" brushRef="#br0">26 0 10136 0 0,'1'3'7937'0'0,"3"10"-6276"0"0,-2 1-964 0 0,-1 0 0 0 0,-1 1 0 0 0,-3 27 0 0 0,3-39-640 0 0,-20 136 1812 0 0,15-114-1318 0 0,2-15 47 0 0,1-14 457 0 0,2-17-212 0 0,2 8-716 0 0,0-1-1 0 0,2 1 1 0 0,-1 0-1 0 0,1 0 0 0 0,1 0 1 0 0,1 1-1 0 0,7-14 1 0 0,-3 9-2 0 0,1 1 1 0 0,1 0 0 0 0,1 1-1 0 0,17-18 1 0 0,-27 30-81 0 0,1 0 0 0 0,-1 0 0 0 0,1 0 0 0 0,-1 1 0 0 0,1-1 0 0 0,0 1 0 0 0,0 0 0 0 0,5-2 1 0 0,-7 3-103 0 0,0 1 1 0 0,1-1-1 0 0,-1 0 1 0 0,0 1-1 0 0,0 0 1 0 0,0 0-1 0 0,0 0 1 0 0,0 0-1 0 0,0 0 1 0 0,1 0-1 0 0,-1 0 1 0 0,0 1-1 0 0,0-1 1 0 0,0 1-1 0 0,0-1 1 0 0,0 1 0 0 0,0 0-1 0 0,0 0 1 0 0,2 1-1 0 0,8 6-1379 0 0,1 2-76 0 0</inkml:trace>
+</inkml:ink>
+</file>
+
+<file path=ppt/ink/ink12.xml><?xml version="1.0" encoding="utf-8"?>
+<inkml:ink xmlns:inkml="http://www.w3.org/2003/InkML">
+  <inkml:definitions>
+    <inkml:context xml:id="ctx0">
+      <inkml:inkSource xml:id="inkSrc0">
+        <inkml:traceFormat>
+          <inkml:channel name="X" type="integer" min="-2.14748E9" max="2.14748E9" units="cm"/>
+          <inkml:channel name="Y" type="integer" min="-2.14748E9" max="2.14748E9" units="cm"/>
+          <inkml:channel name="F" type="integer" max="32767" units="dev"/>
+          <inkml:channel name="OA" type="integer" max="360" units="deg"/>
+          <inkml:channel name="OE" type="integer" max="90" units="deg"/>
+        </inkml:traceFormat>
+        <inkml:channelProperties>
+          <inkml:channelProperty channel="X" name="resolution" value="1000" units="1/cm"/>
+          <inkml:channelProperty channel="Y" name="resolution" value="1000" units="1/cm"/>
+          <inkml:channelProperty channel="F" name="resolution" value="0" units="1/dev"/>
+          <inkml:channelProperty channel="OA" name="resolution" value="1000" units="1/deg"/>
+          <inkml:channelProperty channel="OE" name="resolution" value="1000" units="1/deg"/>
+        </inkml:channelProperties>
+      </inkml:inkSource>
+      <inkml:timestamp xml:id="ts0" timeString="2020-11-16T17:01:05.835"/>
+    </inkml:context>
+    <inkml:brush xml:id="br0">
+      <inkml:brushProperty name="width" value="0.05" units="cm"/>
+      <inkml:brushProperty name="height" value="0.05" units="cm"/>
+      <inkml:brushProperty name="color" value="#004F8B"/>
+    </inkml:brush>
+  </inkml:definitions>
+  <inkml:trace contextRef="#ctx0" brushRef="#br0">1 176 11976 0 0,'5'-8'4719'0'0,"-3"7"-4135"0"0,27-12 631 0 0,-19 10-848 0 0,0-2-1 0 0,0 1 0 0 0,14-11 0 0 0,-14 9-75 0 0,0-1-1 0 0,-1-1 0 0 0,1 0 1 0 0,-2 0-1 0 0,1-1 0 0 0,11-17 0 0 0,-12 16 5 0 0,-6 8-235 0 0,0-1 0 0 0,0 1-1 0 0,-1 0 1 0 0,1-1 0 0 0,-1 0 0 0 0,1 1-1 0 0,-1-1 1 0 0,0 0 0 0 0,0 1 0 0 0,0-1 0 0 0,1-4-1 0 0,-2 7-50 0 0,0 0-1 0 0,0-1 0 0 0,0 1 1 0 0,-1-1-1 0 0,1 1 1 0 0,0 0-1 0 0,0-1 0 0 0,0 1 1 0 0,0-1-1 0 0,0 1 0 0 0,0 0 1 0 0,-1-1-1 0 0,1 1 1 0 0,0 0-1 0 0,0-1 0 0 0,0 1 1 0 0,-1 0-1 0 0,1-1 1 0 0,0 1-1 0 0,-1 0 0 0 0,1-1 1 0 0,0 1-1 0 0,-1 0 0 0 0,1 0 1 0 0,0 0-1 0 0,-1-1 1 0 0,1 1-1 0 0,-1 0 0 0 0,-13-1 107 0 0,-14 9-29 0 0,19-3-79 0 0,1 0-1 0 0,-1 0 1 0 0,1 1-1 0 0,0 0 1 0 0,0 0-1 0 0,0 1 1 0 0,-10 13-1 0 0,6-6 1 0 0,1 0 0 0 0,1 1 0 0 0,-12 22 0 0 0,20-32 36 0 0,0 0 0 0 0,0 0-1 0 0,0 0 1 0 0,1 0 0 0 0,0 0-1 0 0,0 0 1 0 0,0 1 0 0 0,0-1-1 0 0,1 0 1 0 0,0 1 0 0 0,0-1-1 0 0,1 0 1 0 0,0 1 0 0 0,0-1-1 0 0,0 0 1 0 0,0 0 0 0 0,1 0-1 0 0,-1 1 1 0 0,2-2 0 0 0,2 7-1 0 0,-3-8-13 0 0,-1 1 0 0 0,1-1 0 0 0,1-1-1 0 0,-1 1 1 0 0,0 0 0 0 0,1 0-1 0 0,-1-1 1 0 0,1 0 0 0 0,-1 1 0 0 0,1-1-1 0 0,0 0 1 0 0,0 0 0 0 0,0-1 0 0 0,1 1-1 0 0,-1-1 1 0 0,0 1 0 0 0,1-1 0 0 0,-1 0-1 0 0,0 0 1 0 0,1 0 0 0 0,-1-1 0 0 0,1 1-1 0 0,0-1 1 0 0,-1 0 0 0 0,1 0 0 0 0,-1 0-1 0 0,1-1 1 0 0,-1 1 0 0 0,1-1 0 0 0,-1 0-1 0 0,5-1 1 0 0,2-1-99 0 0,1-2-1 0 0,0 1 1 0 0,12-8-1 0 0,-17 9-659 0 0,-1-1-1 0 0,0 1 1 0 0,0-1-1 0 0,6-7 1 0 0,0-2-7119 0 0</inkml:trace>
+</inkml:ink>
+</file>
+
+<file path=ppt/ink/ink13.xml><?xml version="1.0" encoding="utf-8"?>
+<inkml:ink xmlns:inkml="http://www.w3.org/2003/InkML">
+  <inkml:definitions>
+    <inkml:context xml:id="ctx0">
+      <inkml:inkSource xml:id="inkSrc0">
+        <inkml:traceFormat>
+          <inkml:channel name="X" type="integer" min="-2.14748E9" max="2.14748E9" units="cm"/>
+          <inkml:channel name="Y" type="integer" min="-2.14748E9" max="2.14748E9" units="cm"/>
+          <inkml:channel name="F" type="integer" max="32767" units="dev"/>
+          <inkml:channel name="OA" type="integer" max="360" units="deg"/>
+          <inkml:channel name="OE" type="integer" max="90" units="deg"/>
+        </inkml:traceFormat>
+        <inkml:channelProperties>
+          <inkml:channelProperty channel="X" name="resolution" value="1000" units="1/cm"/>
+          <inkml:channelProperty channel="Y" name="resolution" value="1000" units="1/cm"/>
+          <inkml:channelProperty channel="F" name="resolution" value="0" units="1/dev"/>
+          <inkml:channelProperty channel="OA" name="resolution" value="1000" units="1/deg"/>
+          <inkml:channelProperty channel="OE" name="resolution" value="1000" units="1/deg"/>
+        </inkml:channelProperties>
+      </inkml:inkSource>
+      <inkml:timestamp xml:id="ts0" timeString="2020-11-16T17:01:06.179"/>
+    </inkml:context>
+    <inkml:brush xml:id="br0">
+      <inkml:brushProperty name="width" value="0.05" units="cm"/>
+      <inkml:brushProperty name="height" value="0.05" units="cm"/>
+      <inkml:brushProperty name="color" value="#004F8B"/>
+    </inkml:brush>
+  </inkml:definitions>
+  <inkml:trace contextRef="#ctx0" brushRef="#br0">6 0 17855 0 0,'-1'2'107'0'0,"0"0"0"0"0,1-1 0 0 0,-1 1-1 0 0,0 0 1 0 0,1-1 0 0 0,-1 1-1 0 0,1 0 1 0 0,0 0 0 0 0,-1 0 0 0 0,1-1-1 0 0,0 1 1 0 0,0 0 0 0 0,0 0-1 0 0,0 0 1 0 0,1 0 0 0 0,-1-1 0 0 0,0 1-1 0 0,1 0 1 0 0,-1 0 0 0 0,1 0-1 0 0,0-1 1 0 0,0 1 0 0 0,-1 0 0 0 0,1-1-1 0 0,0 1 1 0 0,0-1 0 0 0,3 3-1 0 0,3 5 627 0 0,1 0 1 0 0,0-1-1 0 0,12 10 0 0 0,-12-11-72 0 0,16 16 313 0 0,17 14-818 0 0,15 1-73 0 0,-40-28 130 0 0,-13-9-254 0 0,-1 1 0 0 0,1-1 0 0 0,0 0-1 0 0,0 0 1 0 0,-1 0 0 0 0,1 0 0 0 0,0 0 0 0 0,4 0-1 0 0,-5-1-443 0 0,0 0 0 0 0,0 0 0 0 0,0 0 0 0 0,0 0 0 0 0,0 0-1 0 0,0-1 1 0 0,-1 1 0 0 0,4-1 0 0 0</inkml:trace>
+</inkml:ink>
+</file>
+
+<file path=ppt/ink/ink14.xml><?xml version="1.0" encoding="utf-8"?>
+<inkml:ink xmlns:inkml="http://www.w3.org/2003/InkML">
+  <inkml:definitions>
+    <inkml:context xml:id="ctx0">
+      <inkml:inkSource xml:id="inkSrc0">
+        <inkml:traceFormat>
+          <inkml:channel name="X" type="integer" min="-2.14748E9" max="2.14748E9" units="cm"/>
+          <inkml:channel name="Y" type="integer" min="-2.14748E9" max="2.14748E9" units="cm"/>
+          <inkml:channel name="F" type="integer" max="32767" units="dev"/>
+          <inkml:channel name="OA" type="integer" max="360" units="deg"/>
+          <inkml:channel name="OE" type="integer" max="90" units="deg"/>
+        </inkml:traceFormat>
+        <inkml:channelProperties>
+          <inkml:channelProperty channel="X" name="resolution" value="1000" units="1/cm"/>
+          <inkml:channelProperty channel="Y" name="resolution" value="1000" units="1/cm"/>
+          <inkml:channelProperty channel="F" name="resolution" value="0" units="1/dev"/>
+          <inkml:channelProperty channel="OA" name="resolution" value="1000" units="1/deg"/>
+          <inkml:channelProperty channel="OE" name="resolution" value="1000" units="1/deg"/>
+        </inkml:channelProperties>
+      </inkml:inkSource>
+      <inkml:timestamp xml:id="ts0" timeString="2020-11-16T17:01:06.516"/>
+    </inkml:context>
+    <inkml:brush xml:id="br0">
+      <inkml:brushProperty name="width" value="0.05" units="cm"/>
+      <inkml:brushProperty name="height" value="0.05" units="cm"/>
+      <inkml:brushProperty name="color" value="#004F8B"/>
+    </inkml:brush>
+  </inkml:definitions>
+  <inkml:trace contextRef="#ctx0" brushRef="#br0">260 4 15664 0 0,'-1'-1'83'0'0,"-1"0"0"0"0,1 1 0 0 0,0 0 1 0 0,-1-1-1 0 0,1 1 0 0 0,0 0 1 0 0,-1 0-1 0 0,1-1 0 0 0,-1 1 1 0 0,1 0-1 0 0,0 0 0 0 0,-1 1 1 0 0,1-1-1 0 0,-1 0 0 0 0,1 0 1 0 0,0 1-1 0 0,-1-1 0 0 0,1 1 1 0 0,0-1-1 0 0,-2 2 0 0 0,-1 0-44 0 0,-1 1 0 0 0,1 1 0 0 0,0-1-1 0 0,-4 5 1 0 0,-11 8 1156 0 0,-2 0-560 0 0,0 0-1 0 0,1 2 1 0 0,1 0 0 0 0,-31 39-1 0 0,33-33-412 0 0,-17 27-1 0 0,31-41-3601 0 0</inkml:trace>
+</inkml:ink>
+</file>
+
+<file path=ppt/ink/ink15.xml><?xml version="1.0" encoding="utf-8"?>
+<inkml:ink xmlns:inkml="http://www.w3.org/2003/InkML">
+  <inkml:definitions>
+    <inkml:context xml:id="ctx0">
+      <inkml:inkSource xml:id="inkSrc0">
+        <inkml:traceFormat>
+          <inkml:channel name="X" type="integer" min="-2.14748E9" max="2.14748E9" units="cm"/>
+          <inkml:channel name="Y" type="integer" min="-2.14748E9" max="2.14748E9" units="cm"/>
+          <inkml:channel name="F" type="integer" max="32767" units="dev"/>
+          <inkml:channel name="OA" type="integer" max="360" units="deg"/>
+          <inkml:channel name="OE" type="integer" max="90" units="deg"/>
+        </inkml:traceFormat>
+        <inkml:channelProperties>
+          <inkml:channelProperty channel="X" name="resolution" value="1000" units="1/cm"/>
+          <inkml:channelProperty channel="Y" name="resolution" value="1000" units="1/cm"/>
+          <inkml:channelProperty channel="F" name="resolution" value="0" units="1/dev"/>
+          <inkml:channelProperty channel="OA" name="resolution" value="1000" units="1/deg"/>
+          <inkml:channelProperty channel="OE" name="resolution" value="1000" units="1/deg"/>
+        </inkml:channelProperties>
+      </inkml:inkSource>
+      <inkml:timestamp xml:id="ts0" timeString="2020-11-16T17:01:06.851"/>
+    </inkml:context>
+    <inkml:brush xml:id="br0">
+      <inkml:brushProperty name="width" value="0.05" units="cm"/>
+      <inkml:brushProperty name="height" value="0.05" units="cm"/>
+      <inkml:brushProperty name="color" value="#004F8B"/>
+    </inkml:brush>
+  </inkml:definitions>
+  <inkml:trace contextRef="#ctx0" brushRef="#br0">183 4 17503 0 0,'0'0'858'0'0,"-15"-4"204"0"0,10 5-831 0 0,-1-1-1 0 0,1 1 0 0 0,0 0 0 0 0,0 1 1 0 0,-1-1-1 0 0,1 1 0 0 0,0 0 1 0 0,0 0-1 0 0,0 1 0 0 0,1-1 0 0 0,-1 1 1 0 0,1 0-1 0 0,-9 7 0 0 0,3-1-55 0 0,0 1-1 0 0,1 0 0 0 0,0 1 1 0 0,-10 14-1 0 0,14-17-174 0 0,1 0 0 0 0,0 0 0 0 0,0 0 0 0 0,-5 16 0 0 0,7-20 0 0 0,1 1 0 0 0,0 0 0 0 0,0 0 0 0 0,1 0 0 0 0,-1 0 0 0 0,1 0 0 0 0,0 0 0 0 0,0 0 0 0 0,1 0 0 0 0,0 6 0 0 0,0-10-1 0 0,-1 0 0 0 0,0 0 0 0 0,1 1 0 0 0,-1-1 0 0 0,1 0 0 0 0,-1 0-1 0 0,1 0 1 0 0,-1 1 0 0 0,1-1 0 0 0,0 0 0 0 0,-1 0 0 0 0,1 0 0 0 0,0 0 0 0 0,0 0-1 0 0,0 0 1 0 0,0-1 0 0 0,0 1 0 0 0,0 0 0 0 0,0 0 0 0 0,0-1 0 0 0,0 1 0 0 0,1-1-1 0 0,-1 1 1 0 0,0-1 0 0 0,0 1 0 0 0,1-1 0 0 0,-1 0 0 0 0,0 1 0 0 0,0-1 0 0 0,1 0-1 0 0,-1 0 1 0 0,0 0 0 0 0,1 0 0 0 0,-1 0 0 0 0,0 0 0 0 0,0-1 0 0 0,2 1 0 0 0,2-1 59 0 0,-1-1 1 0 0,0 1 0 0 0,1-1 0 0 0,-1 0 0 0 0,0 0-1 0 0,0 0 1 0 0,0-1 0 0 0,0 0 0 0 0,4-4 0 0 0,-1 0 129 0 0,-1 0 0 0 0,0-1 1 0 0,0 1-1 0 0,-1-1 0 0 0,0-1 1 0 0,-1 1-1 0 0,7-17 1 0 0,-1 4-218 0 0,-4 11 312 0 0,-6 17 356 0 0,-6 22 461 0 0,5-27-1074 0 0,0 4-384 0 0,-1 0 0 0 0,1 0 0 0 0,1 0 0 0 0,-1 9 1 0 0,1-12 184 0 0,0-1 1 0 0,1 1-1 0 0,-1-1 1 0 0,0 0-1 0 0,1 1 1 0 0,0-1-1 0 0,-1 0 1 0 0,1 1-1 0 0,0-1 0 0 0,0 0 1 0 0,1 0-1 0 0,-1 0 1 0 0,0 0-1 0 0,2 2 1 0 0,3 3-1427 0 0</inkml:trace>
+</inkml:ink>
+</file>
+
+<file path=ppt/ink/ink16.xml><?xml version="1.0" encoding="utf-8"?>
+<inkml:ink xmlns:inkml="http://www.w3.org/2003/InkML">
+  <inkml:definitions>
+    <inkml:context xml:id="ctx0">
+      <inkml:inkSource xml:id="inkSrc0">
+        <inkml:traceFormat>
+          <inkml:channel name="X" type="integer" min="-2.14748E9" max="2.14748E9" units="cm"/>
+          <inkml:channel name="Y" type="integer" min="-2.14748E9" max="2.14748E9" units="cm"/>
+          <inkml:channel name="F" type="integer" max="32767" units="dev"/>
+          <inkml:channel name="OA" type="integer" max="360" units="deg"/>
+          <inkml:channel name="OE" type="integer" max="90" units="deg"/>
+        </inkml:traceFormat>
+        <inkml:channelProperties>
+          <inkml:channelProperty channel="X" name="resolution" value="1000" units="1/cm"/>
+          <inkml:channelProperty channel="Y" name="resolution" value="1000" units="1/cm"/>
+          <inkml:channelProperty channel="F" name="resolution" value="0" units="1/dev"/>
+          <inkml:channelProperty channel="OA" name="resolution" value="1000" units="1/deg"/>
+          <inkml:channelProperty channel="OE" name="resolution" value="1000" units="1/deg"/>
+        </inkml:channelProperties>
+      </inkml:inkSource>
+      <inkml:timestamp xml:id="ts0" timeString="2020-11-16T17:01:07.232"/>
+    </inkml:context>
+    <inkml:brush xml:id="br0">
+      <inkml:brushProperty name="width" value="0.05" units="cm"/>
+      <inkml:brushProperty name="height" value="0.05" units="cm"/>
+      <inkml:brushProperty name="color" value="#004F8B"/>
+    </inkml:brush>
+  </inkml:definitions>
+  <inkml:trace contextRef="#ctx0" brushRef="#br0">8 166 14280 0 0,'0'0'1102'0'0,"-8"-9"530"0"0,9 4-1072 0 0,0-1 0 0 0,0 1-1 0 0,0 0 1 0 0,0 0 0 0 0,1 0 0 0 0,0 0-1 0 0,0 0 1 0 0,0 0 0 0 0,0 1 0 0 0,1-1-1 0 0,0 1 1 0 0,0-1 0 0 0,4-3-1 0 0,2-3 108 0 0,1 1-1 0 0,0 0 0 0 0,19-15 0 0 0,-21 20-569 0 0,-8 5-96 0 0,1 0-1 0 0,-1 0 0 0 0,0-1 0 0 0,0 1 1 0 0,1 0-1 0 0,-1 0 0 0 0,0 0 0 0 0,1 0 1 0 0,-1 0-1 0 0,0 0 0 0 0,1 0 0 0 0,-1-1 1 0 0,0 1-1 0 0,1 0 0 0 0,-1 0 0 0 0,0 0 0 0 0,0 0 1 0 0,1 0-1 0 0,-1 1 0 0 0,0-1 0 0 0,1 0 1 0 0,-1 0-1 0 0,0 0 0 0 0,1 0 0 0 0,-1 0 1 0 0,0 0-1 0 0,0 0 0 0 0,1 1 0 0 0,-1-1 0 0 0,0 0 1 0 0,1 0-1 0 0,-1 0 0 0 0,0 1 0 0 0,0-1 1 0 0,0 0-1 0 0,1 0 0 0 0,-1 1 0 0 0,0-1 1 0 0,0 0-1 0 0,0 0 0 0 0,0 1 0 0 0,1-1 0 0 0,-1 0 1 0 0,0 1-1 0 0,0-1 0 0 0,2 3 0 0 0,-1 0 0 0 0,1 0 0 0 0,-1 1 0 0 0,1-1 0 0 0,-1 0 0 0 0,0 0 0 0 0,0 1 0 0 0,-1-1 0 0 0,1 1 0 0 0,-1-1 0 0 0,0 0 0 0 0,0 1 0 0 0,0-1 0 0 0,0 1 0 0 0,0-1 0 0 0,-2 7 0 0 0,0 13 0 0 0,2-23 0 0 0,0 0 0 0 0,0 1 0 0 0,0-1 0 0 0,0 0 0 0 0,0 0 0 0 0,0 0 0 0 0,0 0 0 0 0,0 1 0 0 0,0-1 0 0 0,0 0 0 0 0,0 0 0 0 0,0 0 0 0 0,0 0 0 0 0,0 0 0 0 0,1 1 0 0 0,-1-1 0 0 0,0 0 0 0 0,0 0 0 0 0,0 0 0 0 0,0 0 0 0 0,0 0 0 0 0,0 1 0 0 0,0-1 0 0 0,0 0 0 0 0,0 0 0 0 0,1 0 0 0 0,-1 0 0 0 0,0 0 0 0 0,0 0 0 0 0,0 0 0 0 0,0 0 0 0 0,0 0 0 0 0,1 1 0 0 0,-1-1 0 0 0,0 0 0 0 0,0 0 0 0 0,0 0 0 0 0,0 0 0 0 0,1 0 0 0 0,-1 0 0 0 0,0 0 0 0 0,0 0 0 0 0,0 0 0 0 0,0 0 0 0 0,0 0 0 0 0,1 0 0 0 0,-1 0 0 0 0,0 0 0 0 0,0 0 0 0 0,0 0 0 0 0,0-1 0 0 0,1 1 0 0 0,-1 0 0 0 0,0 0 0 0 0,0 0 0 0 0,0 0 0 0 0,0 0 0 0 0,0 0 0 0 0,0 0 0 0 0,1 0 0 0 0,-1-1 0 0 0,0 1 0 0 0,0 0 0 0 0,0 0 0 0 0,0 0 0 0 0,0 0 0 0 0,0 0 0 0 0,0-1 0 0 0,8-7 0 0 0,-1-1 0 0 0,-1 0 0 0 0,7-14 0 0 0,-10 16 0 0 0,1 1 0 0 0,-1-1 0 0 0,1 1 0 0 0,0 0 0 0 0,1 0 0 0 0,0 1 0 0 0,0-1 0 0 0,9-7 0 0 0,-13 12 2 0 0,0 1 0 0 0,-1-1 0 0 0,1 1 0 0 0,0-1 1 0 0,-1 1-1 0 0,1 0 0 0 0,0-1 0 0 0,0 1 0 0 0,0 0 0 0 0,-1 0 0 0 0,1 0 0 0 0,0-1 0 0 0,0 1 0 0 0,0 0 0 0 0,-1 0 1 0 0,1 0-1 0 0,0 0 0 0 0,0 0 0 0 0,0 0 0 0 0,0 1 0 0 0,-1-1 0 0 0,1 0 0 0 0,1 1 0 0 0,0 0 7 0 0,-1 0 0 0 0,0 0 1 0 0,1 0-1 0 0,-1 0 0 0 0,0 0 0 0 0,0 0 0 0 0,0 1 0 0 0,0-1 1 0 0,0 0-1 0 0,0 1 0 0 0,1 1 0 0 0,1 3 23 0 0,0 1 0 0 0,0 0 0 0 0,-1 0 0 0 0,3 10 0 0 0,-4-13-46 0 0,2 11-642 0 0,0 0-1 0 0,1-1 1 0 0,1 0 0 0 0,12 26-1 0 0,-11-30-791 0 0</inkml:trace>
+</inkml:ink>
+</file>
+
+<file path=ppt/ink/ink17.xml><?xml version="1.0" encoding="utf-8"?>
+<inkml:ink xmlns:inkml="http://www.w3.org/2003/InkML">
+  <inkml:definitions>
+    <inkml:context xml:id="ctx0">
+      <inkml:inkSource xml:id="inkSrc0">
+        <inkml:traceFormat>
+          <inkml:channel name="X" type="integer" min="-2.14748E9" max="2.14748E9" units="cm"/>
+          <inkml:channel name="Y" type="integer" min="-2.14748E9" max="2.14748E9" units="cm"/>
+          <inkml:channel name="F" type="integer" max="32767" units="dev"/>
+          <inkml:channel name="OA" type="integer" max="360" units="deg"/>
+          <inkml:channel name="OE" type="integer" max="90" units="deg"/>
+        </inkml:traceFormat>
+        <inkml:channelProperties>
+          <inkml:channelProperty channel="X" name="resolution" value="1000" units="1/cm"/>
+          <inkml:channelProperty channel="Y" name="resolution" value="1000" units="1/cm"/>
+          <inkml:channelProperty channel="F" name="resolution" value="0" units="1/dev"/>
+          <inkml:channelProperty channel="OA" name="resolution" value="1000" units="1/deg"/>
+          <inkml:channelProperty channel="OE" name="resolution" value="1000" units="1/deg"/>
+        </inkml:channelProperties>
+      </inkml:inkSource>
+      <inkml:timestamp xml:id="ts0" timeString="2020-11-16T17:01:11.457"/>
+    </inkml:context>
+    <inkml:brush xml:id="br0">
+      <inkml:brushProperty name="width" value="0.05" units="cm"/>
+      <inkml:brushProperty name="height" value="0.05" units="cm"/>
+      <inkml:brushProperty name="color" value="#004F8B"/>
+    </inkml:brush>
+  </inkml:definitions>
+  <inkml:trace contextRef="#ctx0" brushRef="#br0">0 1 13680 0 0,'0'0'1033'0'0,"2"1"-701"0"0,1 2-293 0 0,1-1-1 0 0,0 1 1 0 0,0-1 0 0 0,1 0 0 0 0,-1 0-1 0 0,0 0 1 0 0,1-1 0 0 0,-1 0 0 0 0,1 1 0 0 0,-1-2-1 0 0,1 1 1 0 0,-1 0 0 0 0,1-1 0 0 0,9 0-1 0 0,-4-1-59 0 0,1 0 0 0 0,-1-1 0 0 0,1 0 0 0 0,-1 0 0 0 0,20-8 0 0 0,-21 5-5535 0 0</inkml:trace>
+</inkml:ink>
+</file>
+
+<file path=ppt/ink/ink18.xml><?xml version="1.0" encoding="utf-8"?>
+<inkml:ink xmlns:inkml="http://www.w3.org/2003/InkML">
+  <inkml:definitions>
+    <inkml:context xml:id="ctx0">
+      <inkml:inkSource xml:id="inkSrc0">
+        <inkml:traceFormat>
+          <inkml:channel name="X" type="integer" min="-2.14748E9" max="2.14748E9" units="cm"/>
+          <inkml:channel name="Y" type="integer" min="-2.14748E9" max="2.14748E9" units="cm"/>
+          <inkml:channel name="F" type="integer" max="32767" units="dev"/>
+          <inkml:channel name="OA" type="integer" max="360" units="deg"/>
+          <inkml:channel name="OE" type="integer" max="90" units="deg"/>
+        </inkml:traceFormat>
+        <inkml:channelProperties>
+          <inkml:channelProperty channel="X" name="resolution" value="1000" units="1/cm"/>
+          <inkml:channelProperty channel="Y" name="resolution" value="1000" units="1/cm"/>
+          <inkml:channelProperty channel="F" name="resolution" value="0" units="1/dev"/>
+          <inkml:channelProperty channel="OA" name="resolution" value="1000" units="1/deg"/>
+          <inkml:channelProperty channel="OE" name="resolution" value="1000" units="1/deg"/>
+        </inkml:channelProperties>
+      </inkml:inkSource>
+      <inkml:timestamp xml:id="ts0" timeString="2020-11-16T17:01:11.935"/>
+    </inkml:context>
+    <inkml:brush xml:id="br0">
+      <inkml:brushProperty name="width" value="0.05" units="cm"/>
+      <inkml:brushProperty name="height" value="0.05" units="cm"/>
+      <inkml:brushProperty name="color" value="#004F8B"/>
+    </inkml:brush>
+  </inkml:definitions>
+  <inkml:trace contextRef="#ctx0" brushRef="#br0">234 1 11976 0 0,'-1'1'922'0'0,"-1"5"-634"0"0,-1-1 0 0 0,1 1 0 0 0,1-1 0 0 0,-1 1 0 0 0,1-1 0 0 0,0 1 0 0 0,0 0 0 0 0,1 0 0 0 0,0 0 1 0 0,0 7-1 0 0,8 61 2947 0 0,-8-74-3238 0 0,9 56 1111 0 0,8 66 196 0 0,-12-64-1058 0 0,10 152 70 0 0,-33 151-494 0 0,15-332 258 0 0,-24 178-465 0 0,-16-2 756 0 0,25-137-154 0 0,-34 110-132 0 0,-35 81 41 0 0,81-243 17 0 0,1 0 1 0 0,1 1-1 0 0,0-1 1 0 0,1 1-1 0 0,1-1 1 0 0,1 1-1 0 0,0 25 1 0 0,2-40-82 0 0,-1 1 0 0 0,0 0 0 0 0,1-1 1 0 0,0 1-1 0 0,-1-1 0 0 0,1 1 1 0 0,0-1-1 0 0,0 0 0 0 0,1 1 0 0 0,-1-1 1 0 0,0 0-1 0 0,1 0 0 0 0,-1 0 1 0 0,1 0-1 0 0,0 0 0 0 0,0 0 0 0 0,0 0 1 0 0,0 0-1 0 0,0-1 0 0 0,0 1 0 0 0,0-1 1 0 0,0 0-1 0 0,1 1 0 0 0,3 1 1 0 0,4-1 47 0 0,0 1 1 0 0,0-1-1 0 0,0-1 1 0 0,-1 1-1 0 0,13-1 1 0 0,2 0 427 0 0,55 5-138 0 0,-42 1-1202 0 0,-1 1 1 0 0,54 21-1 0 0,-72-23-502 0 0,1-2-51 0 0</inkml:trace>
+</inkml:ink>
+</file>
+
+<file path=ppt/ink/ink19.xml><?xml version="1.0" encoding="utf-8"?>
+<inkml:ink xmlns:inkml="http://www.w3.org/2003/InkML">
+  <inkml:definitions>
+    <inkml:context xml:id="ctx0">
+      <inkml:inkSource xml:id="inkSrc0">
+        <inkml:traceFormat>
+          <inkml:channel name="X" type="integer" min="-2.14748E9" max="2.14748E9" units="cm"/>
+          <inkml:channel name="Y" type="integer" min="-2.14748E9" max="2.14748E9" units="cm"/>
+          <inkml:channel name="F" type="integer" max="32767" units="dev"/>
+          <inkml:channel name="OA" type="integer" max="360" units="deg"/>
+          <inkml:channel name="OE" type="integer" max="90" units="deg"/>
+        </inkml:traceFormat>
+        <inkml:channelProperties>
+          <inkml:channelProperty channel="X" name="resolution" value="1000" units="1/cm"/>
+          <inkml:channelProperty channel="Y" name="resolution" value="1000" units="1/cm"/>
+          <inkml:channelProperty channel="F" name="resolution" value="0" units="1/dev"/>
+          <inkml:channelProperty channel="OA" name="resolution" value="1000" units="1/deg"/>
+          <inkml:channelProperty channel="OE" name="resolution" value="1000" units="1/deg"/>
+        </inkml:channelProperties>
+      </inkml:inkSource>
+      <inkml:timestamp xml:id="ts0" timeString="2020-11-16T17:01:19.911"/>
+    </inkml:context>
+    <inkml:brush xml:id="br0">
+      <inkml:brushProperty name="width" value="0.05" units="cm"/>
+      <inkml:brushProperty name="height" value="0.05" units="cm"/>
+      <inkml:brushProperty name="color" value="#004F8B"/>
+    </inkml:brush>
+  </inkml:definitions>
+  <inkml:trace contextRef="#ctx0" brushRef="#br0">40 51 3680 0 0,'0'0'6754'0'0,"9"-14"-2236"0"0,16-22 913 0 0,-25 36-5404 0 0,1 1 0 0 0,-1-1-1 0 0,0 1 1 0 0,0-1-1 0 0,0 1 1 0 0,1-1-1 0 0,-1 1 1 0 0,0 0-1 0 0,0-1 1 0 0,0 1 0 0 0,0-1-1 0 0,0 1 1 0 0,0-1-1 0 0,0 1 1 0 0,0 0-1 0 0,0-1 1 0 0,-1 1-1 0 0,1-1 1 0 0,0 1 0 0 0,0-1-1 0 0,-1 2 1 0 0,-4 10 196 0 0,-6 7 139 0 0,9-13-173 0 0,-1 0 1 0 0,-1 0-1 0 0,1 0 0 0 0,-1 0 1 0 0,0-1-1 0 0,-1 1 0 0 0,1-1 0 0 0,-1 0 1 0 0,0 0-1 0 0,-8 5 900 0 0,8-28 6 0 0,6 14-1025 0 0,1 0 0 0 0,-1 0 0 0 0,1 0 0 0 0,0 0 0 0 0,1 0 0 0 0,-1 1 0 0 0,0-1 0 0 0,1 1 0 0 0,0 0 0 0 0,0 0 0 0 0,0 0 0 0 0,0 0 0 0 0,1 0 0 0 0,-1 0 0 0 0,1 1 0 0 0,-1 0 0 0 0,8-4 0 0 0,-9 6-27 0 0,-1 0-33 0 0,0 0 1 0 0,-1 0-1 0 0,1 0 1 0 0,0 0-1 0 0,-1 1 1 0 0,1-1 0 0 0,-1 0-1 0 0,1 0 1 0 0,-1 1-1 0 0,1-1 1 0 0,0 0-1 0 0,-1 1 1 0 0,1-1-1 0 0,-1 1 1 0 0,1-1 0 0 0,-1 1-1 0 0,0-1 1 0 0,1 1-1 0 0,-1-1 1 0 0,1 1-1 0 0,-1-1 1 0 0,0 1 0 0 0,0-1-1 0 0,1 1 1 0 0,-1 0-1 0 0,3 14 355 0 0,-4-13-334 0 0,0 4-64 0 0,-1 0 1 0 0,0 1 0 0 0,0-1 0 0 0,-5 9-1 0 0,6-14 38 0 0,0 1-1 0 0,0 0 0 0 0,0-1 0 0 0,0 1 1 0 0,-1-1-1 0 0,1 0 0 0 0,0 1 1 0 0,0-1-1 0 0,-1 0 0 0 0,1 0 1 0 0,-1 0-1 0 0,1 0 0 0 0,-1 0 1 0 0,0 0-1 0 0,1 0 0 0 0,-1-1 0 0 0,0 1 1 0 0,0 0-1 0 0,0-1 0 0 0,1 1 1 0 0,-1-1-1 0 0,0 0 0 0 0,-2 0 0 0 0,3 0-4 0 0,1 0 0 0 0,-1 0 0 0 0,0 0 0 0 0,1 0-1 0 0,-1-1 1 0 0,1 1 0 0 0,-1 0 0 0 0,0 0-1 0 0,1-1 1 0 0,-1 1 0 0 0,1 0 0 0 0,-1-1 0 0 0,1 1-1 0 0,-1-1 1 0 0,1 1 0 0 0,-1-1 0 0 0,1 1-1 0 0,-1-1 1 0 0,1 1 0 0 0,0-1 0 0 0,-1 1 0 0 0,1-1-1 0 0,0 1 1 0 0,-1-1 0 0 0,1 0 0 0 0,0 1-1 0 0,0-1 1 0 0,0 1 0 0 0,0-1 0 0 0,-1 0 0 0 0,1 1-1 0 0,0-1 1 0 0,0 0 0 0 0,0 1 0 0 0,0-1-1 0 0,1-1 1 0 0,-1-1 63 0 0,0-1-1 0 0,0 1 0 0 0,1 0 0 0 0,-1 0 1 0 0,3-6-1 0 0,-2 6-15 0 0,0 1-1 0 0,1-1 1 0 0,-1 0 0 0 0,1 1 0 0 0,0-1 0 0 0,0 1 0 0 0,0-1-1 0 0,0 1 1 0 0,0 0 0 0 0,0 0 0 0 0,0 0 0 0 0,1 0 0 0 0,-1 0-1 0 0,1 1 1 0 0,0-1 0 0 0,4-1 0 0 0,-6 2-44 0 0,-1 1-1 0 0,1 0 1 0 0,-1-1 0 0 0,1 1 0 0 0,-1 0-1 0 0,1 0 1 0 0,0 0 0 0 0,-1 0 0 0 0,1 0 0 0 0,-1-1-1 0 0,1 1 1 0 0,-1 0 0 0 0,1 0 0 0 0,0 0-1 0 0,-1 1 1 0 0,1-1 0 0 0,-1 0 0 0 0,1 0-1 0 0,-1 0 1 0 0,1 0 0 0 0,-1 0 0 0 0,1 1 0 0 0,-1-1-1 0 0,2 1 1 0 0,1 0 7 0 0,0 3-30 0 0,2 12 158 0 0,-5-16-133 0 0,0 1 1 0 0,0-1-1 0 0,0 1 0 0 0,0 0 1 0 0,0-1-1 0 0,0 1 0 0 0,-1-1 1 0 0,1 1-1 0 0,0 0 0 0 0,0-1 1 0 0,0 1-1 0 0,-1-1 0 0 0,1 1 1 0 0,0-1-1 0 0,0 1 0 0 0,-1-1 1 0 0,1 1-1 0 0,0-1 0 0 0,-1 1 1 0 0,1-1-1 0 0,-1 0 0 0 0,1 1 1 0 0,-1-1-1 0 0,0 1 0 0 0,-11 7 131 0 0,11-8-122 0 0,1 1-1 0 0,-1-1 1 0 0,0 0-1 0 0,1 0 0 0 0,-1 0 1 0 0,0 0-1 0 0,1 0 1 0 0,-1 0-1 0 0,1 0 0 0 0,-1 0 1 0 0,0 0-1 0 0,1 0 1 0 0,-1 0-1 0 0,0 0 1 0 0,1-1-1 0 0,-1 1 0 0 0,1 0 1 0 0,-1 0-1 0 0,0-1 1 0 0,1 1-1 0 0,-1 0 0 0 0,1-1 1 0 0,-1 1-1 0 0,1 0 1 0 0,-1-1-1 0 0,1 1 0 0 0,-1-1 1 0 0,1 1-1 0 0,0-1 1 0 0,-1 1-1 0 0,1-1 0 0 0,0 1 1 0 0,-1-1-1 0 0,1 1 1 0 0,0-1-1 0 0,-1 0 0 0 0,-2-4-418 0 0,6 8-707 0 0</inkml:trace>
+</inkml:ink>
+</file>
+
+<file path=ppt/ink/ink2.xml><?xml version="1.0" encoding="utf-8"?>
+<inkml:ink xmlns:inkml="http://www.w3.org/2003/InkML">
+  <inkml:definitions>
+    <inkml:context xml:id="ctx0">
+      <inkml:inkSource xml:id="inkSrc0">
+        <inkml:traceFormat>
+          <inkml:channel name="X" type="integer" min="-2.14748E9" max="2.14748E9" units="cm"/>
+          <inkml:channel name="Y" type="integer" min="-2.14748E9" max="2.14748E9" units="cm"/>
+          <inkml:channel name="F" type="integer" max="32767" units="dev"/>
+          <inkml:channel name="OA" type="integer" max="360" units="deg"/>
+          <inkml:channel name="OE" type="integer" max="90" units="deg"/>
+        </inkml:traceFormat>
+        <inkml:channelProperties>
+          <inkml:channelProperty channel="X" name="resolution" value="1000" units="1/cm"/>
+          <inkml:channelProperty channel="Y" name="resolution" value="1000" units="1/cm"/>
+          <inkml:channelProperty channel="F" name="resolution" value="0" units="1/dev"/>
+          <inkml:channelProperty channel="OA" name="resolution" value="1000" units="1/deg"/>
+          <inkml:channelProperty channel="OE" name="resolution" value="1000" units="1/deg"/>
+        </inkml:channelProperties>
+      </inkml:inkSource>
+      <inkml:timestamp xml:id="ts0" timeString="2020-11-16T17:00:51.706"/>
+    </inkml:context>
+    <inkml:brush xml:id="br0">
+      <inkml:brushProperty name="width" value="0.05" units="cm"/>
+      <inkml:brushProperty name="height" value="0.05" units="cm"/>
+      <inkml:brushProperty name="color" value="#004F8B"/>
+    </inkml:brush>
+  </inkml:definitions>
+  <inkml:trace contextRef="#ctx0" brushRef="#br0">12 38 12816 0 0,'-9'12'935'0'0,"9"-12"-913"0"0,0 0 0 0 0,0 1 1 0 0,-1-1-1 0 0,1 0 1 0 0,0 1-1 0 0,0-1 0 0 0,-1 0 1 0 0,1 1-1 0 0,0-1 1 0 0,0 1-1 0 0,0-1 0 0 0,0 0 1 0 0,0 1-1 0 0,0-1 0 0 0,-1 1 1 0 0,3 4 4058 0 0,-1-5-3070 0 0,8 0-547 0 0,-1 1 0 0 0,1-2 0 0 0,-1 1 1 0 0,1-1-1 0 0,-1 0 0 0 0,1-1 0 0 0,-1 0 1 0 0,13-5-1 0 0,4 0-842 0 0,-13 4 292 0 0,-6 1 7 0 0,1 1 0 0 0,0-1 0 0 0,0 0-1 0 0,0-1 1 0 0,-1 0 0 0 0,0 0 0 0 0,1 0-1 0 0,6-5 1 0 0,-4-3-2768 0 0</inkml:trace>
+</inkml:ink>
+</file>
+
+<file path=ppt/ink/ink20.xml><?xml version="1.0" encoding="utf-8"?>
+<inkml:ink xmlns:inkml="http://www.w3.org/2003/InkML">
+  <inkml:definitions>
+    <inkml:context xml:id="ctx0">
+      <inkml:inkSource xml:id="inkSrc0">
+        <inkml:traceFormat>
+          <inkml:channel name="X" type="integer" min="-2.14748E9" max="2.14748E9" units="cm"/>
+          <inkml:channel name="Y" type="integer" min="-2.14748E9" max="2.14748E9" units="cm"/>
+          <inkml:channel name="F" type="integer" max="32767" units="dev"/>
+          <inkml:channel name="OA" type="integer" max="360" units="deg"/>
+          <inkml:channel name="OE" type="integer" max="90" units="deg"/>
+        </inkml:traceFormat>
+        <inkml:channelProperties>
+          <inkml:channelProperty channel="X" name="resolution" value="1000" units="1/cm"/>
+          <inkml:channelProperty channel="Y" name="resolution" value="1000" units="1/cm"/>
+          <inkml:channelProperty channel="F" name="resolution" value="0" units="1/dev"/>
+          <inkml:channelProperty channel="OA" name="resolution" value="1000" units="1/deg"/>
+          <inkml:channelProperty channel="OE" name="resolution" value="1000" units="1/deg"/>
+        </inkml:channelProperties>
+      </inkml:inkSource>
+      <inkml:timestamp xml:id="ts0" timeString="2020-11-16T17:01:26.746"/>
+    </inkml:context>
+    <inkml:brush xml:id="br0">
+      <inkml:brushProperty name="width" value="0.05" units="cm"/>
+      <inkml:brushProperty name="height" value="0.05" units="cm"/>
+      <inkml:brushProperty name="color" value="#004F8B"/>
+    </inkml:brush>
+  </inkml:definitions>
+  <inkml:trace contextRef="#ctx0" brushRef="#br0">65 114 5984 0 0,'-48'7'3336'0'0,"39"-7"-1425"0"0,1 1 3496 0 0,14 3-3727 0 0,2-2-1366 0 0,-1-1-1 0 0,0 1 1 0 0,1-1-1 0 0,12 0 1 0 0,4 0 223 0 0,21 7 287 0 0,-23-4-258 0 0,29 2-1 0 0,301-1 1720 0 0,-326-6-2169 0 0,176-4 520 0 0,-202 5-566 0 0,-6-5 84 0 0,-17-12-56 0 0,-1 1-1 0 0,0 1 1 0 0,-37-16-1 0 0,36 18-71 0 0,-2 0 9 0 0,0 2 0 0 0,-1 1-1 0 0,-43-9 1 0 0,63 19 77 0 0,7 6 75 0 0,11 8-53 0 0,-2-7-124 0 0,1 0-1 0 0,0-1 0 0 0,0 0 1 0 0,1-1-1 0 0,0 0 1 0 0,-1 0-1 0 0,16 4 0 0 0,1-1 61 0 0,47 8 0 0 0,-56-14-3 0 0,0-1 1 0 0,22-1-1 0 0,-17 0 8 0 0,-21 0-64 0 0,-1 0-1 0 0,1 0 0 0 0,-1 0 1 0 0,1 0-1 0 0,-1 0 1 0 0,1 0-1 0 0,0 0 0 0 0,-1 0 1 0 0,1 1-1 0 0,-1-1 0 0 0,1 0 1 0 0,-1 0-1 0 0,1 0 1 0 0,0 1-1 0 0,-1-1 0 0 0,1 0 1 0 0,-1 1-1 0 0,0-1 1 0 0,1 0-1 0 0,-1 1 0 0 0,1-1 1 0 0,-1 0-1 0 0,1 1 1 0 0,-1-1-1 0 0,0 1 0 0 0,1-1 1 0 0,-1 1-1 0 0,0-1 1 0 0,0 1-1 0 0,1 0 0 0 0,-1 1 13 0 0,0-1-1 0 0,0 1 0 0 0,1-1 1 0 0,-1 1-1 0 0,-1 0 0 0 0,1-1 0 0 0,0 1 1 0 0,0-1-1 0 0,-1 1 0 0 0,1-1 1 0 0,-1 3-1 0 0,-2 3 65 0 0,0 0-1 0 0,0-1 1 0 0,-8 12-1 0 0,-25 35 235 0 0,-46 59-146 0 0,73-102-204 0 0,1 0 102 0 0,-16 15 0 0 0,22-23-114 0 0,0-1 0 0 0,0 1 0 0 0,0 0 0 0 0,0-1 1 0 0,-1 1-1 0 0,1-1 0 0 0,-1 0 0 0 0,1 0 0 0 0,-1 0 0 0 0,1 0 1 0 0,-1 0-1 0 0,0 0 0 0 0,1-1 0 0 0,-4 1 0 0 0,13-14-3415 0 0,1 6 1664 0 0</inkml:trace>
+</inkml:ink>
+</file>
+
+<file path=ppt/ink/ink21.xml><?xml version="1.0" encoding="utf-8"?>
+<inkml:ink xmlns:inkml="http://www.w3.org/2003/InkML">
+  <inkml:definitions>
+    <inkml:context xml:id="ctx0">
+      <inkml:inkSource xml:id="inkSrc0">
+        <inkml:traceFormat>
+          <inkml:channel name="X" type="integer" min="-2.14748E9" max="2.14748E9" units="cm"/>
+          <inkml:channel name="Y" type="integer" min="-2.14748E9" max="2.14748E9" units="cm"/>
+          <inkml:channel name="F" type="integer" max="32767" units="dev"/>
+          <inkml:channel name="OA" type="integer" max="360" units="deg"/>
+          <inkml:channel name="OE" type="integer" max="90" units="deg"/>
+        </inkml:traceFormat>
+        <inkml:channelProperties>
+          <inkml:channelProperty channel="X" name="resolution" value="1000" units="1/cm"/>
+          <inkml:channelProperty channel="Y" name="resolution" value="1000" units="1/cm"/>
+          <inkml:channelProperty channel="F" name="resolution" value="0" units="1/dev"/>
+          <inkml:channelProperty channel="OA" name="resolution" value="1000" units="1/deg"/>
+          <inkml:channelProperty channel="OE" name="resolution" value="1000" units="1/deg"/>
+        </inkml:channelProperties>
+      </inkml:inkSource>
+      <inkml:timestamp xml:id="ts0" timeString="2020-11-16T17:01:57.685"/>
+    </inkml:context>
+    <inkml:brush xml:id="br0">
+      <inkml:brushProperty name="width" value="0.05" units="cm"/>
+      <inkml:brushProperty name="height" value="0.05" units="cm"/>
+      <inkml:brushProperty name="color" value="#004F8B"/>
+    </inkml:brush>
+  </inkml:definitions>
+  <inkml:trace contextRef="#ctx0" brushRef="#br0">0 22 9416 0 0,'0'0'2136'0'0,"15"3"-1512"0"0,-4 0-380 0 0,0-1 0 0 0,0 0 0 0 0,0 0 1 0 0,0-1-1 0 0,19 0 0 0 0,59-9 652 0 0,-63 5-731 0 0,163-10 1269 0 0,-77 15-1013 0 0,107-4 196 0 0,-49-6 368 0 0,-90 5-525 0 0,112 9 0 0 0,-20 7-396 0 0,-80-7-92 0 0,33 3 184 0 0,-89-7-32 0 0,13 1-128 0 0,55 13 44 0 0,37 7 408 0 0,18-1-304 0 0,-151-21-149 0 0,239 14 198 0 0,-151-17-57 0 0,52 2 100 0 0,-52-1-96 0 0,42 4 112 0 0,108 17 20 0 0,-114-18-272 0 0,145-15 191 0 0,-202 7 174 0 0,167-17 213 0 0,82 3 547 0 0,-93 5-461 0 0,42 2 1085 0 0,-233 9-1397 0 0,13-1-172 0 0,-45 5-153 0 0,-1 0 0 0 0,0-1 0 0 0,0 0 0 0 0,9-2 0 0 0,-15 3-82 0 0,0-1 0 0 0,0 1 1 0 0,0-1-1 0 0,0 1 0 0 0,-1-1 0 0 0,1 0 1 0 0,0 1-1 0 0,0-1 0 0 0,0 0 0 0 0,-1 0 1 0 0,1 0-1 0 0,0-1 0 0 0,2 0-1425 0 0</inkml:trace>
+</inkml:ink>
+</file>
+
+<file path=ppt/ink/ink3.xml><?xml version="1.0" encoding="utf-8"?>
+<inkml:ink xmlns:inkml="http://www.w3.org/2003/InkML">
+  <inkml:definitions>
+    <inkml:context xml:id="ctx0">
+      <inkml:inkSource xml:id="inkSrc0">
+        <inkml:traceFormat>
+          <inkml:channel name="X" type="integer" min="-2.14748E9" max="2.14748E9" units="cm"/>
+          <inkml:channel name="Y" type="integer" min="-2.14748E9" max="2.14748E9" units="cm"/>
+          <inkml:channel name="F" type="integer" max="32767" units="dev"/>
+          <inkml:channel name="OA" type="integer" max="360" units="deg"/>
+          <inkml:channel name="OE" type="integer" max="90" units="deg"/>
+        </inkml:traceFormat>
+        <inkml:channelProperties>
+          <inkml:channelProperty channel="X" name="resolution" value="1000" units="1/cm"/>
+          <inkml:channelProperty channel="Y" name="resolution" value="1000" units="1/cm"/>
+          <inkml:channelProperty channel="F" name="resolution" value="0" units="1/dev"/>
+          <inkml:channelProperty channel="OA" name="resolution" value="1000" units="1/deg"/>
+          <inkml:channelProperty channel="OE" name="resolution" value="1000" units="1/deg"/>
+        </inkml:channelProperties>
+      </inkml:inkSource>
+      <inkml:timestamp xml:id="ts0" timeString="2020-11-16T17:00:52.137"/>
+    </inkml:context>
+    <inkml:brush xml:id="br0">
+      <inkml:brushProperty name="width" value="0.05" units="cm"/>
+      <inkml:brushProperty name="height" value="0.05" units="cm"/>
+      <inkml:brushProperty name="color" value="#004F8B"/>
+    </inkml:brush>
+  </inkml:definitions>
+  <inkml:trace contextRef="#ctx0" brushRef="#br0">179 0 13304 0 0,'-2'2'123'0'0,"1"-1"1"0"0,0 1-1 0 0,0 0 0 0 0,0-1 1 0 0,0 1-1 0 0,0 0 1 0 0,0 0-1 0 0,1-1 1 0 0,-1 1-1 0 0,1 0 1 0 0,-1 0-1 0 0,1 0 0 0 0,0 0 1 0 0,-1 0-1 0 0,1 0 1 0 0,0 0-1 0 0,0 0 1 0 0,0 0-1 0 0,1 2 1 0 0,-1 16 1182 0 0,-9 69 1105 0 0,-28 227-1718 0 0,-2-59-1307 0 0,-17 28 1719 0 0,30-149 1222 0 0,26-136-2262 0 0,0 1 0 0 0,-1 0 0 0 0,1-1 0 0 0,0 1 1 0 0,0 0-1 0 0,0-1 0 0 0,0 1 0 0 0,0 0 0 0 0,0 0 0 0 0,0-1 1 0 0,0 1-1 0 0,0 0 0 0 0,1-1 0 0 0,-1 1 0 0 0,0 0 0 0 0,0-1 1 0 0,1 1-1 0 0,-1 0 0 0 0,0-1 0 0 0,1 1 0 0 0,-1 0 1 0 0,0-1-1 0 0,1 1 0 0 0,-1-1 0 0 0,1 1 0 0 0,-1-1 0 0 0,1 1 1 0 0,0-1-1 0 0,-1 1 0 0 0,1-1 0 0 0,-1 0 0 0 0,1 1 0 0 0,0-1 1 0 0,-1 0-1 0 0,1 1 0 0 0,0-1 0 0 0,-1 0 0 0 0,1 0 1 0 0,0 0-1 0 0,-1 1 0 0 0,1-1 0 0 0,0 0 0 0 0,0 0 0 0 0,-1 0 1 0 0,1 0-1 0 0,0 0 0 0 0,0-1 0 0 0,6 1 193 0 0,0-1 1 0 0,-1 0-1 0 0,1 0 0 0 0,6-3 1 0 0,-7 3-114 0 0,1-1-116 0 0,32-7 501 0 0,46-6 0 0 0,-76 14-530 0 0,0 1 0 0 0,-1-1 0 0 0,0 1 0 0 0,16 1 0 0 0,13 7-1522 0 0,-28-5 802 0 0,0-1 1 0 0,0-1-1 0 0,0 1 1 0 0,11-1-1 0 0,-13-1-1200 0 0</inkml:trace>
+</inkml:ink>
+</file>
+
+<file path=ppt/ink/ink4.xml><?xml version="1.0" encoding="utf-8"?>
+<inkml:ink xmlns:inkml="http://www.w3.org/2003/InkML">
+  <inkml:definitions>
+    <inkml:context xml:id="ctx0">
+      <inkml:inkSource xml:id="inkSrc0">
+        <inkml:traceFormat>
+          <inkml:channel name="X" type="integer" min="-2.14748E9" max="2.14748E9" units="cm"/>
+          <inkml:channel name="Y" type="integer" min="-2.14748E9" max="2.14748E9" units="cm"/>
+          <inkml:channel name="F" type="integer" max="32767" units="dev"/>
+          <inkml:channel name="OA" type="integer" max="360" units="deg"/>
+          <inkml:channel name="OE" type="integer" max="90" units="deg"/>
+        </inkml:traceFormat>
+        <inkml:channelProperties>
+          <inkml:channelProperty channel="X" name="resolution" value="1000" units="1/cm"/>
+          <inkml:channelProperty channel="Y" name="resolution" value="1000" units="1/cm"/>
+          <inkml:channelProperty channel="F" name="resolution" value="0" units="1/dev"/>
+          <inkml:channelProperty channel="OA" name="resolution" value="1000" units="1/deg"/>
+          <inkml:channelProperty channel="OE" name="resolution" value="1000" units="1/deg"/>
+        </inkml:channelProperties>
+      </inkml:inkSource>
+      <inkml:timestamp xml:id="ts0" timeString="2020-11-16T17:00:56.447"/>
+    </inkml:context>
+    <inkml:brush xml:id="br0">
+      <inkml:brushProperty name="width" value="0.05" units="cm"/>
+      <inkml:brushProperty name="height" value="0.05" units="cm"/>
+      <inkml:brushProperty name="color" value="#004F8B"/>
+    </inkml:brush>
+  </inkml:definitions>
+  <inkml:trace contextRef="#ctx0" brushRef="#br0">1 6 1840 0 0,'0'0'8036'0'0,"14"24"5487"0"0,-15-25-13644 0 0,1 0-30 0 0,0-2 35 0 0,2 1 171 0 0,0 0-1 0 0,0 0 0 0 0,0 0 1 0 0,0 1-1 0 0,0-1 1 0 0,0 0-1 0 0,0 1 0 0 0,5-3 1 0 0,-2 4-37 0 0,-5 0-18 0 0,1 1 0 0 0,-1-1 0 0 0,0 1 0 0 0,1-1 0 0 0,-1 0 0 0 0,0 1 0 0 0,1-1 0 0 0,-1 1 0 0 0,0-1 0 0 0,0 1 0 0 0,1 0 0 0 0,-1-1 0 0 0,0 1 0 0 0,0-1 0 0 0,0 1 0 0 0,0-1 0 0 0,0 1 0 0 0,0-1 0 0 0,0 1 0 0 0,0-1 0 0 0,0 1 0 0 0,0 0 0 0 0,0-1 0 0 0,0 1 0 0 0,0-1 0 0 0,-1 1 0 0 0,1 1 0 0 0,0-2 0 0 0,0 1 0 0 0,0-1 0 0 0,0 0 0 0 0,0 1 0 0 0,0-1 0 0 0,0 0 0 0 0,0 0 0 0 0,0 1 0 0 0,0-1 0 0 0,0 0 0 0 0,0 1 0 0 0,0-1 0 0 0,0 0 0 0 0,-1 0 0 0 0,1 1 0 0 0,0-1 0 0 0,0 0 0 0 0,0 0 0 0 0,0 1 0 0 0,-1-1 0 0 0,1 0 0 0 0,0 0 0 0 0,-1 1 0 0 0,-4 6 0 0 0,4-7 8 0 0,1 1-1 0 0,0-1 0 0 0,0 1 1 0 0,-1-1-1 0 0,1 1 0 0 0,0-1 1 0 0,-1 0-1 0 0,1 1 0 0 0,-1-1 1 0 0,1 1-1 0 0,0-1 0 0 0,-1 0 1 0 0,1 1-1 0 0,-1-1 0 0 0,1 0 1 0 0,-1 0-1 0 0,1 1 0 0 0,-1-1 1 0 0,1 0-1 0 0,-1 0 0 0 0,0 0 1 0 0,1 0-1 0 0,-1 0 0 0 0,1 0 1 0 0,-1 1-1 0 0,1-1 1 0 0,-1 0-1 0 0,1-1 0 0 0,-1 1 1 0 0,0 0-1 0 0,1 0 0 0 0,-1 0 1 0 0,0 0-1 0 0,1-1 8 0 0,-1 1 0 0 0,1 0 1 0 0,-1-1-1 0 0,1 1 0 0 0,-1-1 1 0 0,1 1-1 0 0,0 0 0 0 0,-1-1 0 0 0,1 1 1 0 0,0-1-1 0 0,-1 1 0 0 0,1-1 1 0 0,0 1-1 0 0,0-1 0 0 0,-1 0 0 0 0,1 0 1 0 0,0 1-230 0 0,12-19 1237 0 0,-12 19-1014 0 0,2-1 18 0 0,-1-1 1 0 0,1 1 0 0 0,0 0 0 0 0,-1-1-1 0 0,1 1 1 0 0,0 0 0 0 0,0 0-1 0 0,0 0 1 0 0,0 0 0 0 0,0 1 0 0 0,0-1-1 0 0,0 0 1 0 0,0 1 0 0 0,0-1-1 0 0,0 1 1 0 0,0 0 0 0 0,0 0 0 0 0,0 0-1 0 0,0 0 1 0 0,0 0 0 0 0,1 0-1 0 0,-1 1 1 0 0,0-1 0 0 0,0 1 0 0 0,2 0-1 0 0,2 2-27 0 0,-6-3 19 0 0,1 1 1 0 0,0-1-1 0 0,-1 1 0 0 0,1-1 0 0 0,-1 1 0 0 0,0-1 1 0 0,1 1-1 0 0,-1-1 0 0 0,1 1 0 0 0,-1 0 0 0 0,0-1 0 0 0,1 1 1 0 0,-1-1-1 0 0,0 1 0 0 0,0 0 0 0 0,1-1 0 0 0,-1 1 1 0 0,0 0-1 0 0,0 0 0 0 0,0-1 0 0 0,0 1 0 0 0,0 0 0 0 0,0-1 1 0 0,0 1-1 0 0,0 0 0 0 0,0-1 0 0 0,0 1 0 0 0,-1 0 1 0 0,1-1-1 0 0,0 1 0 0 0,0 0 0 0 0,-1-1 0 0 0,1 1 0 0 0,0 0 1 0 0,-1-1-1 0 0,0 2 0 0 0,0 0 16 0 0,-1 0-1 0 0,1 0 1 0 0,-1 0-1 0 0,0-1 1 0 0,1 1 0 0 0,-4 3-1 0 0,-15 4 114 0 0,20-9-132 0 0,0 0 0 0 0,0 1 0 0 0,-1-1 0 0 0,1 0 0 0 0,0 0 0 0 0,-1 0 0 0 0,1 0 0 0 0,0 1-1 0 0,-1-1 1 0 0,1 0 0 0 0,0 0 0 0 0,-1 0 0 0 0,1 0 0 0 0,0 0 0 0 0,-1 0 0 0 0,1 0-1 0 0,0 0 1 0 0,-1 0 0 0 0,1 0 0 0 0,0 0 0 0 0,-1 0 0 0 0,1 0 0 0 0,0 0 0 0 0,-1 0 0 0 0,1 0-1 0 0,0 0 1 0 0,-1 0 0 0 0,1-1 0 0 0,0 1 0 0 0,-1 0 0 0 0,1 0 0 0 0,0 0 0 0 0,-1-1 0 0 0,1 1-1 0 0,0 0 1 0 0,-1-1 0 0 0,1 0 208 0 0,11-6-67 0 0,0-1-10 0 0,-10 7-142 0 0,-1 0 0 0 0,1 1 0 0 0,-1-1 1 0 0,1 1-1 0 0,-1-1 0 0 0,1 1 0 0 0,0-1 0 0 0,-1 1 0 0 0,1 0 1 0 0,-1-1-1 0 0,1 1 0 0 0,0 0 0 0 0,-1 0 0 0 0,1-1 1 0 0,0 1-1 0 0,0 0 0 0 0,-1 0 0 0 0,1 0 0 0 0,0 0 0 0 0,0 0 1 0 0,-1 0-1 0 0,1 0 0 0 0,0 0 0 0 0,-1 0 0 0 0,1 0 1 0 0,0 0-1 0 0,0 0 0 0 0,-1 0 0 0 0,1 1 0 0 0,0-1 0 0 0,-1 0 1 0 0,2 1-1 0 0,-2-1-3 0 0,0 1 0 0 0,0-1 0 0 0,1 0 1 0 0,-1 1-1 0 0,0-1 0 0 0,0 0 0 0 0,0 1 0 0 0,0-1 0 0 0,0 1 1 0 0,0-1-1 0 0,0 0 0 0 0,0 1 0 0 0,0-1 0 0 0,0 0 0 0 0,0 1 1 0 0,0-1-1 0 0,0 1 0 0 0,0-1 0 0 0,0 0 0 0 0,0 1 1 0 0,0-1-1 0 0,0 0 0 0 0,-1 1 0 0 0,1-1 0 0 0,0 1 0 0 0,-6 12 11 0 0,4-10 31 0 0,2-2-38 0 0,0 1 7 0 0,-1 0 1 0 0,0-1-1 0 0,0 1 1 0 0,1 0-1 0 0,-1-1 0 0 0,0 1 1 0 0,0 0-1 0 0,0-1 0 0 0,-1 1 1 0 0,1-1-1 0 0,0 0 1 0 0,0 1-1 0 0,-1-1 0 0 0,1 0 1 0 0,-1 0-1 0 0,1 0 0 0 0,-1 0 1 0 0,-2 1-1 0 0,3-1 431 0 0,-16-7 320 0 0,16 5-720 0 0,-1 0 40 0 0,-5-1 181 0 0,6 1-335 0 0,5-6-1478 0 0</inkml:trace>
+</inkml:ink>
+</file>
+
+<file path=ppt/ink/ink5.xml><?xml version="1.0" encoding="utf-8"?>
+<inkml:ink xmlns:inkml="http://www.w3.org/2003/InkML">
+  <inkml:definitions>
+    <inkml:context xml:id="ctx0">
+      <inkml:inkSource xml:id="inkSrc0">
+        <inkml:traceFormat>
+          <inkml:channel name="X" type="integer" min="-2.14748E9" max="2.14748E9" units="cm"/>
+          <inkml:channel name="Y" type="integer" min="-2.14748E9" max="2.14748E9" units="cm"/>
+          <inkml:channel name="F" type="integer" max="32767" units="dev"/>
+          <inkml:channel name="OA" type="integer" max="360" units="deg"/>
+          <inkml:channel name="OE" type="integer" max="90" units="deg"/>
+        </inkml:traceFormat>
+        <inkml:channelProperties>
+          <inkml:channelProperty channel="X" name="resolution" value="1000" units="1/cm"/>
+          <inkml:channelProperty channel="Y" name="resolution" value="1000" units="1/cm"/>
+          <inkml:channelProperty channel="F" name="resolution" value="0" units="1/dev"/>
+          <inkml:channelProperty channel="OA" name="resolution" value="1000" units="1/deg"/>
+          <inkml:channelProperty channel="OE" name="resolution" value="1000" units="1/deg"/>
+        </inkml:channelProperties>
+      </inkml:inkSource>
+      <inkml:timestamp xml:id="ts0" timeString="2020-11-16T17:00:57.863"/>
+    </inkml:context>
+    <inkml:brush xml:id="br0">
+      <inkml:brushProperty name="width" value="0.05" units="cm"/>
+      <inkml:brushProperty name="height" value="0.05" units="cm"/>
+      <inkml:brushProperty name="color" value="#004F8B"/>
+    </inkml:brush>
+  </inkml:definitions>
+  <inkml:trace contextRef="#ctx0" brushRef="#br0">0 40 9672 0 0,'0'0'1796'0'0,"12"-9"2616"0"0,-8 6-3918 0 0,0 1 0 0 0,0 0 0 0 0,0 0 0 0 0,1 1 0 0 0,-1-1 0 0 0,1 1 0 0 0,-1 0 0 0 0,1 0 1 0 0,6 0-1 0 0,-10 1-76 0 0,-1 0-410 0 0,0 0 0 0 0,0 0-1 0 0,0 0 1 0 0,0 0-1 0 0,0 0 1 0 0,0 0 0 0 0,0 0-1 0 0,1 0 1 0 0,-1 0-1 0 0,0 0 1 0 0,0 0 0 0 0,0 0-1 0 0,0 0 1 0 0,0 0-1 0 0,0 0 1 0 0,0 0 0 0 0,0 0-1 0 0,1 0 1 0 0,-1 0 0 0 0,0 0-1 0 0,0 0 1 0 0,0 0-1 0 0,0 0 1 0 0,0 0 0 0 0,0 0-1 0 0,0 0 1 0 0,0 0-1 0 0,1 0 1 0 0,-1 0 0 0 0,0 0-1 0 0,0 1 1 0 0,0-1-1 0 0,0 0 1 0 0,0 0 0 0 0,0 0-1 0 0,0 0 1 0 0,0 0 0 0 0,0 0-1 0 0,0 0 1 0 0,0 0-1 0 0,0 0 1 0 0,0 1 0 0 0,0-1-1 0 0,0 0 1 0 0,0 0-1 0 0,0 0 1 0 0,1 8 398 0 0,-3 7 296 0 0,1-13-673 0 0,0 0 0 0 0,0 1 0 0 0,0-1 0 0 0,-1 0 0 0 0,1 0 0 0 0,0 0 0 0 0,-1 0 0 0 0,0 0 0 0 0,1 0 0 0 0,-1 0 0 0 0,0-1 0 0 0,0 1 1 0 0,0-1-1 0 0,0 1 0 0 0,0-1 0 0 0,-1 0 0 0 0,1 0 0 0 0,0 0 0 0 0,0 0 0 0 0,-1 0 0 0 0,1 0 0 0 0,-1-1 0 0 0,1 1 0 0 0,-5 0 0 0 0,7-1-10 0 0,-1 0 0 0 0,1 0 0 0 0,0 0 0 0 0,-1 0 0 0 0,1 0-1 0 0,0-1 1 0 0,-1 1 0 0 0,1 0 0 0 0,0 0 0 0 0,-1 0 0 0 0,1 0-1 0 0,-1 0 1 0 0,1 0 0 0 0,0-1 0 0 0,0 1 0 0 0,-1 0 0 0 0,1 0 0 0 0,0-1-1 0 0,-1 1 1 0 0,1 0 0 0 0,0 0 0 0 0,0-1 0 0 0,-1 1 0 0 0,1 0-1 0 0,0-1 1 0 0,0 1 0 0 0,0 0 0 0 0,-1-1 0 0 0,1-12 504 0 0,9-13 180 0 0,-8 24-668 0 0,-1 0 9 0 0,1 1-1 0 0,1-1 0 0 0,-1 0 1 0 0,0 1-1 0 0,0-1 0 0 0,0 1 0 0 0,1-1 1 0 0,-1 1-1 0 0,1-1 0 0 0,-1 1 1 0 0,1 0-1 0 0,0 0 0 0 0,1-1 1 0 0,10-7-244 0 0,-4 15 707 0 0,-8-3-475 0 0,0 0 1 0 0,0 0 0 0 0,-1 0 0 0 0,1 0 0 0 0,-1 0 0 0 0,1 1 0 0 0,-1-1 0 0 0,0 6 0 0 0,-1-7 1 0 0,1 0 0 0 0,0-1 1 0 0,0 1-1 0 0,-1 0 1 0 0,1 0-1 0 0,-1-1 1 0 0,1 1-1 0 0,-1 0 1 0 0,0-1-1 0 0,0 1 1 0 0,0-1-1 0 0,0 1 0 0 0,0-1 1 0 0,0 0-1 0 0,0 1 1 0 0,0-1-1 0 0,0 0 1 0 0,-2 2-1 0 0,2-3 125 0 0,-1 3 189 0 0,2-3-317 0 0,0 1 0 0 0,-1-1 0 0 0,1 0 1 0 0,0 1-1 0 0,0-1 0 0 0,0 0 1 0 0,-1 0-1 0 0,1 1 0 0 0,0-1 0 0 0,0 0 1 0 0,-1 1-1 0 0,1-1 0 0 0,0 0 1 0 0,0 0-1 0 0,-1 0 0 0 0,1 1 1 0 0,0-1-1 0 0,-1 0 0 0 0,1 0 0 0 0,0 0 1 0 0,-1 0-1 0 0,1 0 0 0 0,-1 1 1 0 0,1-1-1 0 0,-1 0 0 0 0,0 0-1 0 0,1 0-1 0 0,-1 0 1 0 0,0 0-1 0 0,0-1 1 0 0,0 1-1 0 0,0 0 1 0 0,1 0-1 0 0,-1-1 1 0 0,0 1-1 0 0,0 0 1 0 0,1-1-1 0 0,-1 1 1 0 0,0 0-1 0 0,0-1 1 0 0,1 1-1 0 0,-1-1 1 0 0,0 1-1 0 0,1-1 1 0 0,-1 0-1 0 0,1 1 1 0 0,-1-1 0 0 0,1 0-1 0 0,-1 1 1 0 0,1-1-1 0 0,-1 0 1 0 0,1 0-1 0 0,0 1 1 0 0,-1-2-1 0 0,1 1 13 0 0,0-1 1 0 0,-1 1-1 0 0,1-1 0 0 0,0 1 0 0 0,0 0 0 0 0,0-1 1 0 0,0 1-1 0 0,0-1 0 0 0,0 1 0 0 0,0-1 1 0 0,1 1-1 0 0,-1 0 0 0 0,1-1 0 0 0,-1 1 0 0 0,1 0 1 0 0,-1-1-1 0 0,2-1 0 0 0,5-5-42 0 0,-6 7 0 0 0,5-1 0 0 0,-5 2 0 0 0,-1-1 0 0 0,0 1 0 0 0,1 0 0 0 0,-1 0 0 0 0,1 0 0 0 0,-1 0 0 0 0,0 0 0 0 0,1 0 0 0 0,-1 0 0 0 0,0 0 0 0 0,1 0 0 0 0,-1 1 0 0 0,1-1 0 0 0,-1 0 0 0 0,0 0 0 0 0,1 0 0 0 0,-1 0 0 0 0,0 0 0 0 0,1 1 0 0 0,-1-1 0 0 0,0 0 0 0 0,0 0 0 0 0,1 0 0 0 0,-1 1 0 0 0,0-1 0 0 0,1 0 0 0 0,-1 1 0 0 0,0-1 0 0 0,1 1 0 0 0,2 1 0 0 0,0 3 0 0 0,-3-4 2 0 0,0-1-1 0 0,1 1 1 0 0,-1-1 0 0 0,0 1-1 0 0,0-1 1 0 0,0 1 0 0 0,1 0-1 0 0,-1-1 1 0 0,0 1 0 0 0,0-1-1 0 0,0 1 1 0 0,0-1 0 0 0,0 1-1 0 0,0-1 1 0 0,0 1 0 0 0,0 0-1 0 0,0-1 1 0 0,0 1 0 0 0,0-1-1 0 0,-1 1 1 0 0,1-1 0 0 0,0 1-1 0 0,0-1 1 0 0,0 1-1 0 0,-1-1 1 0 0,1 1 0 0 0,0-1-1 0 0,-1 1 1 0 0,0 0 0 0 0,-8 11-7 0 0,9-11-92 0 0,-3 1-91 0 0</inkml:trace>
+</inkml:ink>
+</file>
+
+<file path=ppt/ink/ink6.xml><?xml version="1.0" encoding="utf-8"?>
+<inkml:ink xmlns:inkml="http://www.w3.org/2003/InkML">
+  <inkml:definitions>
+    <inkml:context xml:id="ctx0">
+      <inkml:inkSource xml:id="inkSrc0">
+        <inkml:traceFormat>
+          <inkml:channel name="X" type="integer" min="-2.14748E9" max="2.14748E9" units="cm"/>
+          <inkml:channel name="Y" type="integer" min="-2.14748E9" max="2.14748E9" units="cm"/>
+          <inkml:channel name="F" type="integer" max="32767" units="dev"/>
+          <inkml:channel name="OA" type="integer" max="360" units="deg"/>
+          <inkml:channel name="OE" type="integer" max="90" units="deg"/>
+        </inkml:traceFormat>
+        <inkml:channelProperties>
+          <inkml:channelProperty channel="X" name="resolution" value="1000" units="1/cm"/>
+          <inkml:channelProperty channel="Y" name="resolution" value="1000" units="1/cm"/>
+          <inkml:channelProperty channel="F" name="resolution" value="0" units="1/dev"/>
+          <inkml:channelProperty channel="OA" name="resolution" value="1000" units="1/deg"/>
+          <inkml:channelProperty channel="OE" name="resolution" value="1000" units="1/deg"/>
+        </inkml:channelProperties>
+      </inkml:inkSource>
+      <inkml:timestamp xml:id="ts0" timeString="2020-11-16T17:01:03.102"/>
+    </inkml:context>
+    <inkml:brush xml:id="br0">
+      <inkml:brushProperty name="width" value="0.05" units="cm"/>
+      <inkml:brushProperty name="height" value="0.05" units="cm"/>
+      <inkml:brushProperty name="color" value="#004F8B"/>
+    </inkml:brush>
+  </inkml:definitions>
+  <inkml:trace contextRef="#ctx0" brushRef="#br0">3 74 11520 0 0,'0'0'528'0'0,"0"0"-16"0"0,-1 0-477 0 0,1 0 1 0 0,0 0-1 0 0,0 1 1 0 0,0-1-1 0 0,0 0 0 0 0,0 0 1 0 0,-1 0-1 0 0,1 0 1 0 0,0 0-1 0 0,0 0 1 0 0,0 1-1 0 0,0-1 1 0 0,0 0-1 0 0,0 0 1 0 0,0 0-1 0 0,0 0 1 0 0,-1 1-1 0 0,1-1 1 0 0,0 0-1 0 0,0 0 1 0 0,0 0-1 0 0,0 0 1 0 0,0 1-1 0 0,0-1 0 0 0,0 0 1 0 0,0 0-1 0 0,0 0 1 0 0,0 1-1 0 0,0-1 1 0 0,0 0-1 0 0,0 0 1 0 0,0 0-1 0 0,1 0 1 0 0,-1 1-1 0 0,0-1 1 0 0,0 0-1 0 0,0 0 1 0 0,0 0-1 0 0,0 0 1 0 0,0 1-1 0 0,0-1 1 0 0,0 0-1 0 0,1 0 0 0 0,-1 0 1 0 0,0 0-1 0 0,0 0 1 0 0,0 1-1 0 0,8 5 1969 0 0,-5-3-1332 0 0,0-1 1 0 0,0 0-1 0 0,0 1 0 0 0,0-2 1 0 0,1 1-1 0 0,5 2 0 0 0,3 0-519 0 0,1-1-1 0 0,13 3 1 0 0,-7-3 255 0 0,231 32 1191 0 0,-247-35-1575 0 0,-2 0-24 0 0,0 1 1 0 0,-1-1-1 0 0,1 0 0 0 0,0 0 1 0 0,-1 0-1 0 0,1 0 1 0 0,0 0-1 0 0,0 0 0 0 0,-1 0 1 0 0,1-1-1 0 0,0 1 0 0 0,-1 0 1 0 0,1 0-1 0 0,0 0 1 0 0,-1-1-1 0 0,2 0 0 0 0,-2 1-1 0 0,1 0-1 0 0,-1 0 1 0 0,0-1-1 0 0,0 1 1 0 0,0 0-1 0 0,0 0 1 0 0,0-1-1 0 0,1 1 1 0 0,-1 0-1 0 0,0 0 1 0 0,0-1-1 0 0,0 1 0 0 0,0 0 1 0 0,0 0-1 0 0,0-1 1 0 0,0 1-1 0 0,0 0 1 0 0,0-1-1 0 0,0 1 1 0 0,0 0-1 0 0,0 0 1 0 0,0-1-1 0 0,0 1 1 0 0,0 0-1 0 0,0-1 1 0 0,-1 1-1 0 0,1 0 1 0 0,0 0-1 0 0,0-1 1 0 0,0 1-1 0 0,0 0 1 0 0,0 0-1 0 0,-1 0 0 0 0,1-1 1 0 0,0 1-1 0 0,0 0 1 0 0,-1 0-1 0 0,-5-9 67 0 0,-5-2 284 0 0,-1 0 0 0 0,0 1 0 0 0,0 0-1 0 0,-1 1 1 0 0,-24-13 0 0 0,4 3-352 0 0,14 6 160 0 0,-40-17 1 0 0,59 30 130 0 0,5 6-24 0 0,1 0-255 0 0,1 0 1 0 0,0 0-1 0 0,0-1 0 0 0,0 0 0 0 0,13 7 1 0 0,42 17 88 0 0,-34-17 22 0 0,-12-6 32 0 0,1-1 1 0 0,32 7-1 0 0,-35-10-63 0 0,1 1 0 0 0,-1 1 0 0 0,-1 0 0 0 0,1 1-1 0 0,13 7 1 0 0,-26-11-68 0 0,1-1 0 0 0,-1 1-1 0 0,0-1 1 0 0,-1 1 0 0 0,1-1 0 0 0,0 1-1 0 0,0 0 1 0 0,0-1 0 0 0,0 1 0 0 0,0 0-1 0 0,-1 0 1 0 0,1 0 0 0 0,0 0 0 0 0,0-1-1 0 0,-1 1 1 0 0,1 0 0 0 0,-1 0 0 0 0,1 0-1 0 0,-1 0 1 0 0,0 1 0 0 0,1-1 0 0 0,-1 0-1 0 0,0 0 1 0 0,1 0 0 0 0,-1 0 0 0 0,0 0-1 0 0,0 0 1 0 0,0 0 0 0 0,0 1 0 0 0,0-1-1 0 0,0 0 1 0 0,-1 0 0 0 0,1 0 0 0 0,0 0-1 0 0,-1 0 1 0 0,1 0 0 0 0,0 0 0 0 0,-1 0-1 0 0,1 0 1 0 0,-1 0 0 0 0,0 0 0 0 0,-1 2-1 0 0,-2 2 140 0 0,-1 0-1 0 0,1 0 0 0 0,-1 0 0 0 0,0 0 0 0 0,-11 6 0 0 0,-191 136-1450 0 0,195-139-105 0 0,3 0-68 0 0</inkml:trace>
+</inkml:ink>
+</file>
+
+<file path=ppt/ink/ink7.xml><?xml version="1.0" encoding="utf-8"?>
+<inkml:ink xmlns:inkml="http://www.w3.org/2003/InkML">
+  <inkml:definitions>
+    <inkml:context xml:id="ctx0">
+      <inkml:inkSource xml:id="inkSrc0">
+        <inkml:traceFormat>
+          <inkml:channel name="X" type="integer" min="-2.14748E9" max="2.14748E9" units="cm"/>
+          <inkml:channel name="Y" type="integer" min="-2.14748E9" max="2.14748E9" units="cm"/>
+          <inkml:channel name="F" type="integer" max="32767" units="dev"/>
+          <inkml:channel name="OA" type="integer" max="360" units="deg"/>
+          <inkml:channel name="OE" type="integer" max="90" units="deg"/>
+        </inkml:traceFormat>
+        <inkml:channelProperties>
+          <inkml:channelProperty channel="X" name="resolution" value="1000" units="1/cm"/>
+          <inkml:channelProperty channel="Y" name="resolution" value="1000" units="1/cm"/>
+          <inkml:channelProperty channel="F" name="resolution" value="0" units="1/dev"/>
+          <inkml:channelProperty channel="OA" name="resolution" value="1000" units="1/deg"/>
+          <inkml:channelProperty channel="OE" name="resolution" value="1000" units="1/deg"/>
+        </inkml:channelProperties>
+      </inkml:inkSource>
+      <inkml:timestamp xml:id="ts0" timeString="2020-11-16T17:01:03.565"/>
+    </inkml:context>
+    <inkml:brush xml:id="br0">
+      <inkml:brushProperty name="width" value="0.05" units="cm"/>
+      <inkml:brushProperty name="height" value="0.05" units="cm"/>
+      <inkml:brushProperty name="color" value="#004F8B"/>
+    </inkml:brush>
+  </inkml:definitions>
+  <inkml:trace contextRef="#ctx0" brushRef="#br0">39 38 11056 0 0,'5'-11'1176'0'0,"-4"8"-1213"0"0,0 2 410 0 0,-1-1 1 0 0,1 0-1 0 0,0 0 1 0 0,0 0-1 0 0,0 1 1 0 0,-1-1-1 0 0,2 0 1 0 0,-1 1-1 0 0,0-1 1 0 0,0 1-1 0 0,1-1 1 0 0,3-2 2114 0 0,-3 12-563 0 0,0 4-1624 0 0,-1-1-1 0 0,0 0 1 0 0,-1 1 0 0 0,-1 14-1 0 0,1 0-63 0 0,-4 51 72 0 0,-15 91 0 0 0,8-93-230 0 0,-2 11-66 0 0,5-44-52 0 0,-4 85 0 0 0,13-118-234 0 0,-1 0 0 0 0,5 17 0 0 0,0-8-235 0 0</inkml:trace>
+</inkml:ink>
+</file>
+
+<file path=ppt/ink/ink8.xml><?xml version="1.0" encoding="utf-8"?>
+<inkml:ink xmlns:inkml="http://www.w3.org/2003/InkML">
+  <inkml:definitions>
+    <inkml:context xml:id="ctx0">
+      <inkml:inkSource xml:id="inkSrc0">
+        <inkml:traceFormat>
+          <inkml:channel name="X" type="integer" min="-2.14748E9" max="2.14748E9" units="cm"/>
+          <inkml:channel name="Y" type="integer" min="-2.14748E9" max="2.14748E9" units="cm"/>
+          <inkml:channel name="F" type="integer" max="32767" units="dev"/>
+          <inkml:channel name="OA" type="integer" max="360" units="deg"/>
+          <inkml:channel name="OE" type="integer" max="90" units="deg"/>
+        </inkml:traceFormat>
+        <inkml:channelProperties>
+          <inkml:channelProperty channel="X" name="resolution" value="1000" units="1/cm"/>
+          <inkml:channelProperty channel="Y" name="resolution" value="1000" units="1/cm"/>
+          <inkml:channelProperty channel="F" name="resolution" value="0" units="1/dev"/>
+          <inkml:channelProperty channel="OA" name="resolution" value="1000" units="1/deg"/>
+          <inkml:channelProperty channel="OE" name="resolution" value="1000" units="1/deg"/>
+        </inkml:channelProperties>
+      </inkml:inkSource>
+      <inkml:timestamp xml:id="ts0" timeString="2020-11-16T17:01:04.228"/>
+    </inkml:context>
+    <inkml:brush xml:id="br0">
+      <inkml:brushProperty name="width" value="0.05" units="cm"/>
+      <inkml:brushProperty name="height" value="0.05" units="cm"/>
+      <inkml:brushProperty name="color" value="#004F8B"/>
+    </inkml:brush>
+  </inkml:definitions>
+  <inkml:trace contextRef="#ctx0" brushRef="#br0">65 59 2304 0 0,'-5'-17'2011'0'0,"3"13"-205"0"0,0 0 1 0 0,0 0-1 0 0,1-1 1 0 0,0 1 0 0 0,0 0-1 0 0,0-1 1 0 0,0-6-1 0 0,-8 41-1159 0 0,-1 33-597 0 0,-2 91 0 0 0,6-68-85 0 0,-5 153 1101 0 0,10-230-927 0 0,1 0 1 0 0,1 0 0 0 0,-1 0-1 0 0,2 0 1 0 0,-1 0 0 0 0,1-1-1 0 0,5 14 1 0 0,-7-21-126 0 0,0-1-1 0 0,0 1 1 0 0,1 0 0 0 0,-1-1-1 0 0,0 1 1 0 0,1-1 0 0 0,-1 1-1 0 0,1-1 1 0 0,-1 1 0 0 0,1 0-1 0 0,-1-1 1 0 0,1 0 0 0 0,-1 1-1 0 0,1-1 1 0 0,0 1 0 0 0,-1-1-1 0 0,1 0 1 0 0,-1 1 0 0 0,1-1-1 0 0,0 0 1 0 0,-1 0 0 0 0,1 1-1 0 0,1-1 1 0 0,-1 0 8 0 0,1 0 0 0 0,-1 0 0 0 0,0-1 0 0 0,0 1 0 0 0,1 0 1 0 0,-1-1-1 0 0,0 1 0 0 0,0 0 0 0 0,0-1 0 0 0,1 0 0 0 0,-1 1 0 0 0,1-2 0 0 0,5-3 103 0 0,-1 0 0 0 0,0-1 0 0 0,8-9 0 0 0,-7 8 11 0 0,88-83 1538 0 0,-73 72-912 0 0,26-16 0 0 0,-45 32-716 0 0,0 0 0 0 0,0 1 0 0 0,0-1 0 0 0,0 1-1 0 0,0 0 1 0 0,0-1 0 0 0,0 2 0 0 0,0-1 0 0 0,1 0 0 0 0,-1 1 0 0 0,0-1-1 0 0,1 1 1 0 0,4 0 0 0 0,-6 0-32 0 0,-1 1 0 0 0,1-1 1 0 0,-1 1-1 0 0,1-1 0 0 0,-1 1 0 0 0,1 0 0 0 0,-1-1 0 0 0,1 1 0 0 0,-1 0 0 0 0,0 0 1 0 0,0 0-1 0 0,0 0 0 0 0,1 0 0 0 0,-1 0 0 0 0,0 1 0 0 0,0-1 0 0 0,0 0 0 0 0,0 0 1 0 0,-1 1-1 0 0,1-1 0 0 0,0 1 0 0 0,-1-1 0 0 0,1 0 0 0 0,-1 1 0 0 0,1-1 1 0 0,-1 1-1 0 0,1 0 0 0 0,-1-1 0 0 0,0 1 0 0 0,0 2 0 0 0,1 8 2 0 0,-1-1-1 0 0,-1 1 0 0 0,0-1 1 0 0,-3 16-1 0 0,-13 46 75 0 0,14-65-89 0 0,-1 8 52 0 0,2-11-342 0 0,0 0 1 0 0,1-1 0 0 0,-1 1-1 0 0,1 0 1 0 0,0 0-1 0 0,1 0 1 0 0,-1 0-1 0 0,1 1 1 0 0,0-1-1 0 0,1 0 1 0 0,-1 0-1 0 0,2 6 1 0 0,1-6-1453 0 0,6-4-277 0 0</inkml:trace>
+</inkml:ink>
+</file>
+
+<file path=ppt/ink/ink9.xml><?xml version="1.0" encoding="utf-8"?>
+<inkml:ink xmlns:inkml="http://www.w3.org/2003/InkML">
+  <inkml:definitions>
+    <inkml:context xml:id="ctx0">
+      <inkml:inkSource xml:id="inkSrc0">
+        <inkml:traceFormat>
+          <inkml:channel name="X" type="integer" min="-2.14748E9" max="2.14748E9" units="cm"/>
+          <inkml:channel name="Y" type="integer" min="-2.14748E9" max="2.14748E9" units="cm"/>
+          <inkml:channel name="F" type="integer" max="32767" units="dev"/>
+          <inkml:channel name="OA" type="integer" max="360" units="deg"/>
+          <inkml:channel name="OE" type="integer" max="90" units="deg"/>
+        </inkml:traceFormat>
+        <inkml:channelProperties>
+          <inkml:channelProperty channel="X" name="resolution" value="1000" units="1/cm"/>
+          <inkml:channelProperty channel="Y" name="resolution" value="1000" units="1/cm"/>
+          <inkml:channelProperty channel="F" name="resolution" value="0" units="1/dev"/>
+          <inkml:channelProperty channel="OA" name="resolution" value="1000" units="1/deg"/>
+          <inkml:channelProperty channel="OE" name="resolution" value="1000" units="1/deg"/>
+        </inkml:channelProperties>
+      </inkml:inkSource>
+      <inkml:timestamp xml:id="ts0" timeString="2020-11-16T17:01:04.568"/>
+    </inkml:context>
+    <inkml:brush xml:id="br0">
+      <inkml:brushProperty name="width" value="0.05" units="cm"/>
+      <inkml:brushProperty name="height" value="0.05" units="cm"/>
+      <inkml:brushProperty name="color" value="#004F8B"/>
+    </inkml:brush>
+  </inkml:definitions>
+  <inkml:trace contextRef="#ctx0" brushRef="#br0">167 56 2304 0 0,'0'-4'-21'0'0,"0"1"0"0"0,0 0 1 0 0,0-1-1 0 0,0 1 0 0 0,0 0 0 0 0,-1-1 1 0 0,1 1-1 0 0,-3-6 0 0 0,2 8 247 0 0,1-1-1 0 0,-1 1 0 0 0,0 0 1 0 0,1 0-1 0 0,-1-1 1 0 0,0 1-1 0 0,0 0 0 0 0,0 0 1 0 0,0 0-1 0 0,-1-1 1 0 0,1 1 459 0 0,0 1 0 0 0,0-1 0 0 0,0 0 0 0 0,0 1 0 0 0,-1-1 0 0 0,1 1 0 0 0,0 0 0 0 0,0-1 0 0 0,0 1 0 0 0,-1 0 0 0 0,1 0 0 0 0,0-1 1 0 0,-2 1-1 0 0,-1 0-115 0 0,0 1 1 0 0,0-1-1 0 0,0 1 1 0 0,-1 0-1 0 0,1 0 1 0 0,1 0-1 0 0,-1 0 1 0 0,0 1-1 0 0,0-1 1 0 0,0 1 0 0 0,-4 3-1 0 0,3-2-258 0 0,0 1 0 0 0,0 0 0 0 0,1 0 0 0 0,0 1 0 0 0,0-1 0 0 0,0 1 0 0 0,-4 5 0 0 0,2 0-137 0 0,1-1 0 0 0,0 1 0 0 0,1-1 0 0 0,0 2 0 0 0,0-1 0 0 0,1 0 0 0 0,0 1 0 0 0,-1 14 0 0 0,2-11-77 0 0,-2 26 182 0 0,4-36-252 0 0,0-1-1 0 0,0 1 1 0 0,1-1 0 0 0,-1 0-1 0 0,1 0 1 0 0,0 1-1 0 0,0-1 1 0 0,0 0 0 0 0,3 6-1 0 0,-4-9-18 0 0,1 1 0 0 0,-1 0 0 0 0,0 0 0 0 0,1-1 0 0 0,-1 1-1 0 0,1 0 1 0 0,-1-1 0 0 0,1 1 0 0 0,-1 0 0 0 0,1-1 0 0 0,0 1 0 0 0,-1-1 0 0 0,1 1-1 0 0,0-1 1 0 0,-1 1 0 0 0,1-1 0 0 0,0 1 0 0 0,0-1 0 0 0,-1 0 0 0 0,1 0-1 0 0,0 1 1 0 0,0-1 0 0 0,0 0 0 0 0,0 0 0 0 0,-1 0 0 0 0,1 0 0 0 0,0 0 0 0 0,0 0-1 0 0,0 0 1 0 0,0 0 0 0 0,0 0 0 0 0,-1 0 0 0 0,1 0 0 0 0,0-1 0 0 0,0 1-1 0 0,0 0 1 0 0,-1-1 0 0 0,1 1 0 0 0,0 0 0 0 0,0-1 0 0 0,4-2 27 0 0,-1-1 0 0 0,0 1 1 0 0,0-1-1 0 0,0 0 0 0 0,4-5 0 0 0,-1 2 15 0 0,10-13-41 0 0,25-38 0 0 0,-4 4-4452 0 0,-29 42-1149 0 0,0-1-1483 0 0</inkml:trace>
+</inkml:ink>
 </file>
 
 <file path=ppt/notesMasters/notesMaster1.xml><?xml version="1.0" encoding="utf-8"?>
@@ -838,7 +1510,7 @@
           <a:p>
             <a:fld id="{3A2BF66F-FEB0-48C1-A8B9-A73F54BB1A08}" type="datetimeFigureOut">
               <a:rPr lang="en-US" smtClean="0"/>
-              <a:t>11/15/2020</a:t>
+              <a:t>11/16/2020</a:t>
             </a:fld>
             <a:endParaRPr lang="en-US"/>
           </a:p>
@@ -1038,7 +1710,7 @@
           <a:p>
             <a:fld id="{3A2BF66F-FEB0-48C1-A8B9-A73F54BB1A08}" type="datetimeFigureOut">
               <a:rPr lang="en-US" smtClean="0"/>
-              <a:t>11/15/2020</a:t>
+              <a:t>11/16/2020</a:t>
             </a:fld>
             <a:endParaRPr lang="en-US"/>
           </a:p>
@@ -1248,7 +1920,7 @@
           <a:p>
             <a:fld id="{3A2BF66F-FEB0-48C1-A8B9-A73F54BB1A08}" type="datetimeFigureOut">
               <a:rPr lang="en-US" smtClean="0"/>
-              <a:t>11/15/2020</a:t>
+              <a:t>11/16/2020</a:t>
             </a:fld>
             <a:endParaRPr lang="en-US"/>
           </a:p>
@@ -1448,7 +2120,7 @@
           <a:p>
             <a:fld id="{3A2BF66F-FEB0-48C1-A8B9-A73F54BB1A08}" type="datetimeFigureOut">
               <a:rPr lang="en-US" smtClean="0"/>
-              <a:t>11/15/2020</a:t>
+              <a:t>11/16/2020</a:t>
             </a:fld>
             <a:endParaRPr lang="en-US"/>
           </a:p>
@@ -1725,7 +2397,7 @@
           <a:p>
             <a:fld id="{3A2BF66F-FEB0-48C1-A8B9-A73F54BB1A08}" type="datetimeFigureOut">
               <a:rPr lang="en-US" smtClean="0"/>
-              <a:t>11/15/2020</a:t>
+              <a:t>11/16/2020</a:t>
             </a:fld>
             <a:endParaRPr lang="en-US"/>
           </a:p>
@@ -1992,7 +2664,7 @@
           <a:p>
             <a:fld id="{3A2BF66F-FEB0-48C1-A8B9-A73F54BB1A08}" type="datetimeFigureOut">
               <a:rPr lang="en-US" smtClean="0"/>
-              <a:t>11/15/2020</a:t>
+              <a:t>11/16/2020</a:t>
             </a:fld>
             <a:endParaRPr lang="en-US"/>
           </a:p>
@@ -2406,7 +3078,7 @@
           <a:p>
             <a:fld id="{3A2BF66F-FEB0-48C1-A8B9-A73F54BB1A08}" type="datetimeFigureOut">
               <a:rPr lang="en-US" smtClean="0"/>
-              <a:t>11/15/2020</a:t>
+              <a:t>11/16/2020</a:t>
             </a:fld>
             <a:endParaRPr lang="en-US"/>
           </a:p>
@@ -2549,7 +3221,7 @@
           <a:p>
             <a:fld id="{3A2BF66F-FEB0-48C1-A8B9-A73F54BB1A08}" type="datetimeFigureOut">
               <a:rPr lang="en-US" smtClean="0"/>
-              <a:t>11/15/2020</a:t>
+              <a:t>11/16/2020</a:t>
             </a:fld>
             <a:endParaRPr lang="en-US"/>
           </a:p>
@@ -2664,7 +3336,7 @@
           <a:p>
             <a:fld id="{3A2BF66F-FEB0-48C1-A8B9-A73F54BB1A08}" type="datetimeFigureOut">
               <a:rPr lang="en-US" smtClean="0"/>
-              <a:t>11/15/2020</a:t>
+              <a:t>11/16/2020</a:t>
             </a:fld>
             <a:endParaRPr lang="en-US"/>
           </a:p>
@@ -2976,7 +3648,7 @@
           <a:p>
             <a:fld id="{3A2BF66F-FEB0-48C1-A8B9-A73F54BB1A08}" type="datetimeFigureOut">
               <a:rPr lang="en-US" smtClean="0"/>
-              <a:t>11/15/2020</a:t>
+              <a:t>11/16/2020</a:t>
             </a:fld>
             <a:endParaRPr lang="en-US"/>
           </a:p>
@@ -3266,7 +3938,7 @@
           <a:p>
             <a:fld id="{3A2BF66F-FEB0-48C1-A8B9-A73F54BB1A08}" type="datetimeFigureOut">
               <a:rPr lang="en-US" smtClean="0"/>
-              <a:t>11/15/2020</a:t>
+              <a:t>11/16/2020</a:t>
             </a:fld>
             <a:endParaRPr lang="en-US"/>
           </a:p>
@@ -3509,7 +4181,7 @@
           <a:p>
             <a:fld id="{3A2BF66F-FEB0-48C1-A8B9-A73F54BB1A08}" type="datetimeFigureOut">
               <a:rPr lang="en-US" smtClean="0"/>
-              <a:t>11/15/2020</a:t>
+              <a:t>11/16/2020</a:t>
             </a:fld>
             <a:endParaRPr lang="en-US"/>
           </a:p>
@@ -4236,6 +4908,1110 @@
           </a:p>
         </p:txBody>
       </p:sp>
+      <mc:AlternateContent xmlns:mc="http://schemas.openxmlformats.org/markup-compatibility/2006">
+        <mc:Choice xmlns:p14="http://schemas.microsoft.com/office/powerpoint/2010/main" Requires="p14">
+          <p:contentPart p14:bwMode="auto" r:id="rId2">
+            <p14:nvContentPartPr>
+              <p14:cNvPr id="4" name="Ink 3">
+                <a:extLst>
+                  <a:ext uri="{FF2B5EF4-FFF2-40B4-BE49-F238E27FC236}">
+                    <a16:creationId xmlns:a16="http://schemas.microsoft.com/office/drawing/2014/main" id="{6CE46A75-624B-4F03-9451-CB5505C6FD1F}"/>
+                  </a:ext>
+                </a:extLst>
+              </p14:cNvPr>
+              <p14:cNvContentPartPr/>
+              <p14:nvPr/>
+            </p14:nvContentPartPr>
+            <p14:xfrm>
+              <a:off x="1848169" y="2407219"/>
+              <a:ext cx="857880" cy="38880"/>
+            </p14:xfrm>
+          </p:contentPart>
+        </mc:Choice>
+        <mc:Fallback>
+          <p:pic>
+            <p:nvPicPr>
+              <p:cNvPr id="4" name="Ink 3">
+                <a:extLst>
+                  <a:ext uri="{FF2B5EF4-FFF2-40B4-BE49-F238E27FC236}">
+                    <a16:creationId xmlns:a16="http://schemas.microsoft.com/office/drawing/2014/main" id="{6CE46A75-624B-4F03-9451-CB5505C6FD1F}"/>
+                  </a:ext>
+                </a:extLst>
+              </p:cNvPr>
+              <p:cNvPicPr/>
+              <p:nvPr/>
+            </p:nvPicPr>
+            <p:blipFill>
+              <a:blip r:embed="rId3"/>
+              <a:stretch>
+                <a:fillRect/>
+              </a:stretch>
+            </p:blipFill>
+            <p:spPr>
+              <a:xfrm>
+                <a:off x="1839529" y="2398579"/>
+                <a:ext cx="875520" cy="56520"/>
+              </a:xfrm>
+              <a:prstGeom prst="rect">
+                <a:avLst/>
+              </a:prstGeom>
+            </p:spPr>
+          </p:pic>
+        </mc:Fallback>
+      </mc:AlternateContent>
+      <p:grpSp>
+        <p:nvGrpSpPr>
+          <p:cNvPr id="7" name="Group 6">
+            <a:extLst>
+              <a:ext uri="{FF2B5EF4-FFF2-40B4-BE49-F238E27FC236}">
+                <a16:creationId xmlns:a16="http://schemas.microsoft.com/office/drawing/2014/main" id="{72B30FEA-32C8-4BF3-925F-A89CA98987A1}"/>
+              </a:ext>
+            </a:extLst>
+          </p:cNvPr>
+          <p:cNvGrpSpPr/>
+          <p:nvPr/>
+        </p:nvGrpSpPr>
+        <p:grpSpPr>
+          <a:xfrm>
+            <a:off x="835129" y="2865139"/>
+            <a:ext cx="155880" cy="421560"/>
+            <a:chOff x="835129" y="2865139"/>
+            <a:chExt cx="155880" cy="421560"/>
+          </a:xfrm>
+        </p:grpSpPr>
+        <mc:AlternateContent xmlns:mc="http://schemas.openxmlformats.org/markup-compatibility/2006">
+          <mc:Choice xmlns:p14="http://schemas.microsoft.com/office/powerpoint/2010/main" Requires="p14">
+            <p:contentPart p14:bwMode="auto" r:id="rId4">
+              <p14:nvContentPartPr>
+                <p14:cNvPr id="5" name="Ink 4">
+                  <a:extLst>
+                    <a:ext uri="{FF2B5EF4-FFF2-40B4-BE49-F238E27FC236}">
+                      <a16:creationId xmlns:a16="http://schemas.microsoft.com/office/drawing/2014/main" id="{EB7BDC0A-AEBE-47A4-8EBB-6C71F51CD410}"/>
+                    </a:ext>
+                  </a:extLst>
+                </p14:cNvPr>
+                <p14:cNvContentPartPr/>
+                <p14:nvPr/>
+              </p14:nvContentPartPr>
+              <p14:xfrm>
+                <a:off x="917209" y="2865139"/>
+                <a:ext cx="73800" cy="22320"/>
+              </p14:xfrm>
+            </p:contentPart>
+          </mc:Choice>
+          <mc:Fallback>
+            <p:pic>
+              <p:nvPicPr>
+                <p:cNvPr id="5" name="Ink 4">
+                  <a:extLst>
+                    <a:ext uri="{FF2B5EF4-FFF2-40B4-BE49-F238E27FC236}">
+                      <a16:creationId xmlns:a16="http://schemas.microsoft.com/office/drawing/2014/main" id="{EB7BDC0A-AEBE-47A4-8EBB-6C71F51CD410}"/>
+                    </a:ext>
+                  </a:extLst>
+                </p:cNvPr>
+                <p:cNvPicPr/>
+                <p:nvPr/>
+              </p:nvPicPr>
+              <p:blipFill>
+                <a:blip r:embed="rId5"/>
+                <a:stretch>
+                  <a:fillRect/>
+                </a:stretch>
+              </p:blipFill>
+              <p:spPr>
+                <a:xfrm>
+                  <a:off x="908209" y="2856139"/>
+                  <a:ext cx="91440" cy="39960"/>
+                </a:xfrm>
+                <a:prstGeom prst="rect">
+                  <a:avLst/>
+                </a:prstGeom>
+              </p:spPr>
+            </p:pic>
+          </mc:Fallback>
+        </mc:AlternateContent>
+        <mc:AlternateContent xmlns:mc="http://schemas.openxmlformats.org/markup-compatibility/2006">
+          <mc:Choice xmlns:p14="http://schemas.microsoft.com/office/powerpoint/2010/main" Requires="p14">
+            <p:contentPart p14:bwMode="auto" r:id="rId6">
+              <p14:nvContentPartPr>
+                <p14:cNvPr id="6" name="Ink 5">
+                  <a:extLst>
+                    <a:ext uri="{FF2B5EF4-FFF2-40B4-BE49-F238E27FC236}">
+                      <a16:creationId xmlns:a16="http://schemas.microsoft.com/office/drawing/2014/main" id="{649384BF-4902-4D13-A2EF-3A42FEC05A93}"/>
+                    </a:ext>
+                  </a:extLst>
+                </p14:cNvPr>
+                <p14:cNvContentPartPr/>
+                <p14:nvPr/>
+              </p14:nvContentPartPr>
+              <p14:xfrm>
+                <a:off x="835129" y="2867659"/>
+                <a:ext cx="128160" cy="419040"/>
+              </p14:xfrm>
+            </p:contentPart>
+          </mc:Choice>
+          <mc:Fallback>
+            <p:pic>
+              <p:nvPicPr>
+                <p:cNvPr id="6" name="Ink 5">
+                  <a:extLst>
+                    <a:ext uri="{FF2B5EF4-FFF2-40B4-BE49-F238E27FC236}">
+                      <a16:creationId xmlns:a16="http://schemas.microsoft.com/office/drawing/2014/main" id="{649384BF-4902-4D13-A2EF-3A42FEC05A93}"/>
+                    </a:ext>
+                  </a:extLst>
+                </p:cNvPr>
+                <p:cNvPicPr/>
+                <p:nvPr/>
+              </p:nvPicPr>
+              <p:blipFill>
+                <a:blip r:embed="rId7"/>
+                <a:stretch>
+                  <a:fillRect/>
+                </a:stretch>
+              </p:blipFill>
+              <p:spPr>
+                <a:xfrm>
+                  <a:off x="826129" y="2858659"/>
+                  <a:ext cx="145800" cy="436680"/>
+                </a:xfrm>
+                <a:prstGeom prst="rect">
+                  <a:avLst/>
+                </a:prstGeom>
+              </p:spPr>
+            </p:pic>
+          </mc:Fallback>
+        </mc:AlternateContent>
+      </p:grpSp>
+      <mc:AlternateContent xmlns:mc="http://schemas.openxmlformats.org/markup-compatibility/2006">
+        <mc:Choice xmlns:p14="http://schemas.microsoft.com/office/powerpoint/2010/main" Requires="p14">
+          <p:contentPart p14:bwMode="auto" r:id="rId8">
+            <p14:nvContentPartPr>
+              <p14:cNvPr id="8" name="Ink 7">
+                <a:extLst>
+                  <a:ext uri="{FF2B5EF4-FFF2-40B4-BE49-F238E27FC236}">
+                    <a16:creationId xmlns:a16="http://schemas.microsoft.com/office/drawing/2014/main" id="{61C6AD0D-4E3C-47B5-9F8C-B0E7814F979B}"/>
+                  </a:ext>
+                </a:extLst>
+              </p14:cNvPr>
+              <p14:cNvContentPartPr/>
+              <p14:nvPr/>
+            </p14:nvContentPartPr>
+            <p14:xfrm>
+              <a:off x="4087009" y="2929579"/>
+              <a:ext cx="33120" cy="32400"/>
+            </p14:xfrm>
+          </p:contentPart>
+        </mc:Choice>
+        <mc:Fallback>
+          <p:pic>
+            <p:nvPicPr>
+              <p:cNvPr id="8" name="Ink 7">
+                <a:extLst>
+                  <a:ext uri="{FF2B5EF4-FFF2-40B4-BE49-F238E27FC236}">
+                    <a16:creationId xmlns:a16="http://schemas.microsoft.com/office/drawing/2014/main" id="{61C6AD0D-4E3C-47B5-9F8C-B0E7814F979B}"/>
+                  </a:ext>
+                </a:extLst>
+              </p:cNvPr>
+              <p:cNvPicPr/>
+              <p:nvPr/>
+            </p:nvPicPr>
+            <p:blipFill>
+              <a:blip r:embed="rId9"/>
+              <a:stretch>
+                <a:fillRect/>
+              </a:stretch>
+            </p:blipFill>
+            <p:spPr>
+              <a:xfrm>
+                <a:off x="4078369" y="2920939"/>
+                <a:ext cx="50760" cy="50040"/>
+              </a:xfrm>
+              <a:prstGeom prst="rect">
+                <a:avLst/>
+              </a:prstGeom>
+            </p:spPr>
+          </p:pic>
+        </mc:Fallback>
+      </mc:AlternateContent>
+      <mc:AlternateContent xmlns:mc="http://schemas.openxmlformats.org/markup-compatibility/2006">
+        <mc:Choice xmlns:p14="http://schemas.microsoft.com/office/powerpoint/2010/main" Requires="p14">
+          <p:contentPart p14:bwMode="auto" r:id="rId10">
+            <p14:nvContentPartPr>
+              <p14:cNvPr id="9" name="Ink 8">
+                <a:extLst>
+                  <a:ext uri="{FF2B5EF4-FFF2-40B4-BE49-F238E27FC236}">
+                    <a16:creationId xmlns:a16="http://schemas.microsoft.com/office/drawing/2014/main" id="{E77670B5-A93D-4EA1-B325-360EE21627E4}"/>
+                  </a:ext>
+                </a:extLst>
+              </p14:cNvPr>
+              <p14:cNvContentPartPr/>
+              <p14:nvPr/>
+            </p14:nvContentPartPr>
+            <p14:xfrm>
+              <a:off x="4396249" y="3217579"/>
+              <a:ext cx="24480" cy="29160"/>
+            </p14:xfrm>
+          </p:contentPart>
+        </mc:Choice>
+        <mc:Fallback>
+          <p:pic>
+            <p:nvPicPr>
+              <p:cNvPr id="9" name="Ink 8">
+                <a:extLst>
+                  <a:ext uri="{FF2B5EF4-FFF2-40B4-BE49-F238E27FC236}">
+                    <a16:creationId xmlns:a16="http://schemas.microsoft.com/office/drawing/2014/main" id="{E77670B5-A93D-4EA1-B325-360EE21627E4}"/>
+                  </a:ext>
+                </a:extLst>
+              </p:cNvPr>
+              <p:cNvPicPr/>
+              <p:nvPr/>
+            </p:nvPicPr>
+            <p:blipFill>
+              <a:blip r:embed="rId11"/>
+              <a:stretch>
+                <a:fillRect/>
+              </a:stretch>
+            </p:blipFill>
+            <p:spPr>
+              <a:xfrm>
+                <a:off x="4387249" y="3208939"/>
+                <a:ext cx="42120" cy="46800"/>
+              </a:xfrm>
+              <a:prstGeom prst="rect">
+                <a:avLst/>
+              </a:prstGeom>
+            </p:spPr>
+          </p:pic>
+        </mc:Fallback>
+      </mc:AlternateContent>
+      <mc:AlternateContent xmlns:mc="http://schemas.openxmlformats.org/markup-compatibility/2006">
+        <mc:Choice xmlns:p14="http://schemas.microsoft.com/office/powerpoint/2010/main" Requires="p14">
+          <p:contentPart p14:bwMode="auto" r:id="rId12">
+            <p14:nvContentPartPr>
+              <p14:cNvPr id="10" name="Ink 9">
+                <a:extLst>
+                  <a:ext uri="{FF2B5EF4-FFF2-40B4-BE49-F238E27FC236}">
+                    <a16:creationId xmlns:a16="http://schemas.microsoft.com/office/drawing/2014/main" id="{318F4950-D7B6-4A0D-96E7-D808D499312E}"/>
+                  </a:ext>
+                </a:extLst>
+              </p14:cNvPr>
+              <p14:cNvContentPartPr/>
+              <p14:nvPr/>
+            </p14:nvContentPartPr>
+            <p14:xfrm>
+              <a:off x="4636369" y="2982139"/>
+              <a:ext cx="182160" cy="137520"/>
+            </p14:xfrm>
+          </p:contentPart>
+        </mc:Choice>
+        <mc:Fallback>
+          <p:pic>
+            <p:nvPicPr>
+              <p:cNvPr id="10" name="Ink 9">
+                <a:extLst>
+                  <a:ext uri="{FF2B5EF4-FFF2-40B4-BE49-F238E27FC236}">
+                    <a16:creationId xmlns:a16="http://schemas.microsoft.com/office/drawing/2014/main" id="{318F4950-D7B6-4A0D-96E7-D808D499312E}"/>
+                  </a:ext>
+                </a:extLst>
+              </p:cNvPr>
+              <p:cNvPicPr/>
+              <p:nvPr/>
+            </p:nvPicPr>
+            <p:blipFill>
+              <a:blip r:embed="rId13"/>
+              <a:stretch>
+                <a:fillRect/>
+              </a:stretch>
+            </p:blipFill>
+            <p:spPr>
+              <a:xfrm>
+                <a:off x="4627369" y="2973499"/>
+                <a:ext cx="199800" cy="155160"/>
+              </a:xfrm>
+              <a:prstGeom prst="rect">
+                <a:avLst/>
+              </a:prstGeom>
+            </p:spPr>
+          </p:pic>
+        </mc:Fallback>
+      </mc:AlternateContent>
+      <mc:AlternateContent xmlns:mc="http://schemas.openxmlformats.org/markup-compatibility/2006">
+        <mc:Choice xmlns:p14="http://schemas.microsoft.com/office/powerpoint/2010/main" Requires="p14">
+          <p:contentPart p14:bwMode="auto" r:id="rId14">
+            <p14:nvContentPartPr>
+              <p14:cNvPr id="11" name="Ink 10">
+                <a:extLst>
+                  <a:ext uri="{FF2B5EF4-FFF2-40B4-BE49-F238E27FC236}">
+                    <a16:creationId xmlns:a16="http://schemas.microsoft.com/office/drawing/2014/main" id="{34D1C5B9-9A56-444C-9288-AE6FB4445D81}"/>
+                  </a:ext>
+                </a:extLst>
+              </p14:cNvPr>
+              <p14:cNvContentPartPr/>
+              <p14:nvPr/>
+            </p14:nvContentPartPr>
+            <p14:xfrm>
+              <a:off x="5048569" y="2811139"/>
+              <a:ext cx="24840" cy="267840"/>
+            </p14:xfrm>
+          </p:contentPart>
+        </mc:Choice>
+        <mc:Fallback>
+          <p:pic>
+            <p:nvPicPr>
+              <p:cNvPr id="11" name="Ink 10">
+                <a:extLst>
+                  <a:ext uri="{FF2B5EF4-FFF2-40B4-BE49-F238E27FC236}">
+                    <a16:creationId xmlns:a16="http://schemas.microsoft.com/office/drawing/2014/main" id="{34D1C5B9-9A56-444C-9288-AE6FB4445D81}"/>
+                  </a:ext>
+                </a:extLst>
+              </p:cNvPr>
+              <p:cNvPicPr/>
+              <p:nvPr/>
+            </p:nvPicPr>
+            <p:blipFill>
+              <a:blip r:embed="rId15"/>
+              <a:stretch>
+                <a:fillRect/>
+              </a:stretch>
+            </p:blipFill>
+            <p:spPr>
+              <a:xfrm>
+                <a:off x="5039569" y="2802139"/>
+                <a:ext cx="42480" cy="285480"/>
+              </a:xfrm>
+              <a:prstGeom prst="rect">
+                <a:avLst/>
+              </a:prstGeom>
+            </p:spPr>
+          </p:pic>
+        </mc:Fallback>
+      </mc:AlternateContent>
+      <p:grpSp>
+        <p:nvGrpSpPr>
+          <p:cNvPr id="22" name="Group 21">
+            <a:extLst>
+              <a:ext uri="{FF2B5EF4-FFF2-40B4-BE49-F238E27FC236}">
+                <a16:creationId xmlns:a16="http://schemas.microsoft.com/office/drawing/2014/main" id="{A01558E8-3726-4A5E-9D1F-05214E75B794}"/>
+              </a:ext>
+            </a:extLst>
+          </p:cNvPr>
+          <p:cNvGrpSpPr/>
+          <p:nvPr/>
+        </p:nvGrpSpPr>
+        <p:grpSpPr>
+          <a:xfrm>
+            <a:off x="5310649" y="2796379"/>
+            <a:ext cx="416880" cy="271800"/>
+            <a:chOff x="5310649" y="2796379"/>
+            <a:chExt cx="416880" cy="271800"/>
+          </a:xfrm>
+        </p:grpSpPr>
+        <mc:AlternateContent xmlns:mc="http://schemas.openxmlformats.org/markup-compatibility/2006">
+          <mc:Choice xmlns:p14="http://schemas.microsoft.com/office/powerpoint/2010/main" Requires="p14">
+            <p:contentPart p14:bwMode="auto" r:id="rId16">
+              <p14:nvContentPartPr>
+                <p14:cNvPr id="12" name="Ink 11">
+                  <a:extLst>
+                    <a:ext uri="{FF2B5EF4-FFF2-40B4-BE49-F238E27FC236}">
+                      <a16:creationId xmlns:a16="http://schemas.microsoft.com/office/drawing/2014/main" id="{D71FE661-C522-40E2-B73D-A5C98903C302}"/>
+                    </a:ext>
+                  </a:extLst>
+                </p14:cNvPr>
+                <p14:cNvContentPartPr/>
+                <p14:nvPr/>
+              </p14:nvContentPartPr>
+              <p14:xfrm>
+                <a:off x="5310649" y="2796379"/>
+                <a:ext cx="118080" cy="270720"/>
+              </p14:xfrm>
+            </p:contentPart>
+          </mc:Choice>
+          <mc:Fallback>
+            <p:pic>
+              <p:nvPicPr>
+                <p:cNvPr id="12" name="Ink 11">
+                  <a:extLst>
+                    <a:ext uri="{FF2B5EF4-FFF2-40B4-BE49-F238E27FC236}">
+                      <a16:creationId xmlns:a16="http://schemas.microsoft.com/office/drawing/2014/main" id="{D71FE661-C522-40E2-B73D-A5C98903C302}"/>
+                    </a:ext>
+                  </a:extLst>
+                </p:cNvPr>
+                <p:cNvPicPr/>
+                <p:nvPr/>
+              </p:nvPicPr>
+              <p:blipFill>
+                <a:blip r:embed="rId17"/>
+                <a:stretch>
+                  <a:fillRect/>
+                </a:stretch>
+              </p:blipFill>
+              <p:spPr>
+                <a:xfrm>
+                  <a:off x="5301649" y="2787739"/>
+                  <a:ext cx="135720" cy="288360"/>
+                </a:xfrm>
+                <a:prstGeom prst="rect">
+                  <a:avLst/>
+                </a:prstGeom>
+              </p:spPr>
+            </p:pic>
+          </mc:Fallback>
+        </mc:AlternateContent>
+        <mc:AlternateContent xmlns:mc="http://schemas.openxmlformats.org/markup-compatibility/2006">
+          <mc:Choice xmlns:p14="http://schemas.microsoft.com/office/powerpoint/2010/main" Requires="p14">
+            <p:contentPart p14:bwMode="auto" r:id="rId18">
+              <p14:nvContentPartPr>
+                <p14:cNvPr id="13" name="Ink 12">
+                  <a:extLst>
+                    <a:ext uri="{FF2B5EF4-FFF2-40B4-BE49-F238E27FC236}">
+                      <a16:creationId xmlns:a16="http://schemas.microsoft.com/office/drawing/2014/main" id="{0EA1A849-E324-4895-9074-1092D906329E}"/>
+                    </a:ext>
+                  </a:extLst>
+                </p14:cNvPr>
+                <p14:cNvContentPartPr/>
+                <p14:nvPr/>
+              </p14:nvContentPartPr>
+              <p14:xfrm>
+                <a:off x="5452849" y="2958739"/>
+                <a:ext cx="68400" cy="95760"/>
+              </p14:xfrm>
+            </p:contentPart>
+          </mc:Choice>
+          <mc:Fallback>
+            <p:pic>
+              <p:nvPicPr>
+                <p:cNvPr id="13" name="Ink 12">
+                  <a:extLst>
+                    <a:ext uri="{FF2B5EF4-FFF2-40B4-BE49-F238E27FC236}">
+                      <a16:creationId xmlns:a16="http://schemas.microsoft.com/office/drawing/2014/main" id="{0EA1A849-E324-4895-9074-1092D906329E}"/>
+                    </a:ext>
+                  </a:extLst>
+                </p:cNvPr>
+                <p:cNvPicPr/>
+                <p:nvPr/>
+              </p:nvPicPr>
+              <p:blipFill>
+                <a:blip r:embed="rId19"/>
+                <a:stretch>
+                  <a:fillRect/>
+                </a:stretch>
+              </p:blipFill>
+              <p:spPr>
+                <a:xfrm>
+                  <a:off x="5443849" y="2949739"/>
+                  <a:ext cx="86040" cy="113400"/>
+                </a:xfrm>
+                <a:prstGeom prst="rect">
+                  <a:avLst/>
+                </a:prstGeom>
+              </p:spPr>
+            </p:pic>
+          </mc:Fallback>
+        </mc:AlternateContent>
+        <mc:AlternateContent xmlns:mc="http://schemas.openxmlformats.org/markup-compatibility/2006">
+          <mc:Choice xmlns:p14="http://schemas.microsoft.com/office/powerpoint/2010/main" Requires="p14">
+            <p:contentPart p14:bwMode="auto" r:id="rId20">
+              <p14:nvContentPartPr>
+                <p14:cNvPr id="14" name="Ink 13">
+                  <a:extLst>
+                    <a:ext uri="{FF2B5EF4-FFF2-40B4-BE49-F238E27FC236}">
+                      <a16:creationId xmlns:a16="http://schemas.microsoft.com/office/drawing/2014/main" id="{86327ADA-7F79-4EBF-A2E7-D46E93B8FDA7}"/>
+                    </a:ext>
+                  </a:extLst>
+                </p14:cNvPr>
+                <p14:cNvContentPartPr/>
+                <p14:nvPr/>
+              </p14:nvContentPartPr>
+              <p14:xfrm>
+                <a:off x="5530969" y="2964499"/>
+                <a:ext cx="74160" cy="99360"/>
+              </p14:xfrm>
+            </p:contentPart>
+          </mc:Choice>
+          <mc:Fallback>
+            <p:pic>
+              <p:nvPicPr>
+                <p:cNvPr id="14" name="Ink 13">
+                  <a:extLst>
+                    <a:ext uri="{FF2B5EF4-FFF2-40B4-BE49-F238E27FC236}">
+                      <a16:creationId xmlns:a16="http://schemas.microsoft.com/office/drawing/2014/main" id="{86327ADA-7F79-4EBF-A2E7-D46E93B8FDA7}"/>
+                    </a:ext>
+                  </a:extLst>
+                </p:cNvPr>
+                <p:cNvPicPr/>
+                <p:nvPr/>
+              </p:nvPicPr>
+              <p:blipFill>
+                <a:blip r:embed="rId21"/>
+                <a:stretch>
+                  <a:fillRect/>
+                </a:stretch>
+              </p:blipFill>
+              <p:spPr>
+                <a:xfrm>
+                  <a:off x="5522329" y="2955499"/>
+                  <a:ext cx="91800" cy="117000"/>
+                </a:xfrm>
+                <a:prstGeom prst="rect">
+                  <a:avLst/>
+                </a:prstGeom>
+              </p:spPr>
+            </p:pic>
+          </mc:Fallback>
+        </mc:AlternateContent>
+        <mc:AlternateContent xmlns:mc="http://schemas.openxmlformats.org/markup-compatibility/2006">
+          <mc:Choice xmlns:p14="http://schemas.microsoft.com/office/powerpoint/2010/main" Requires="p14">
+            <p:contentPart p14:bwMode="auto" r:id="rId22">
+              <p14:nvContentPartPr>
+                <p14:cNvPr id="15" name="Ink 14">
+                  <a:extLst>
+                    <a:ext uri="{FF2B5EF4-FFF2-40B4-BE49-F238E27FC236}">
+                      <a16:creationId xmlns:a16="http://schemas.microsoft.com/office/drawing/2014/main" id="{36ED0552-083F-4E23-B81A-29B1E6C9B7AC}"/>
+                    </a:ext>
+                  </a:extLst>
+                </p14:cNvPr>
+                <p14:cNvContentPartPr/>
+                <p14:nvPr/>
+              </p14:nvContentPartPr>
+              <p14:xfrm>
+                <a:off x="5647249" y="2967739"/>
+                <a:ext cx="80280" cy="100440"/>
+              </p14:xfrm>
+            </p:contentPart>
+          </mc:Choice>
+          <mc:Fallback>
+            <p:pic>
+              <p:nvPicPr>
+                <p:cNvPr id="15" name="Ink 14">
+                  <a:extLst>
+                    <a:ext uri="{FF2B5EF4-FFF2-40B4-BE49-F238E27FC236}">
+                      <a16:creationId xmlns:a16="http://schemas.microsoft.com/office/drawing/2014/main" id="{36ED0552-083F-4E23-B81A-29B1E6C9B7AC}"/>
+                    </a:ext>
+                  </a:extLst>
+                </p:cNvPr>
+                <p:cNvPicPr/>
+                <p:nvPr/>
+              </p:nvPicPr>
+              <p:blipFill>
+                <a:blip r:embed="rId23"/>
+                <a:stretch>
+                  <a:fillRect/>
+                </a:stretch>
+              </p:blipFill>
+              <p:spPr>
+                <a:xfrm>
+                  <a:off x="5638609" y="2958739"/>
+                  <a:ext cx="97920" cy="118080"/>
+                </a:xfrm>
+                <a:prstGeom prst="rect">
+                  <a:avLst/>
+                </a:prstGeom>
+              </p:spPr>
+            </p:pic>
+          </mc:Fallback>
+        </mc:AlternateContent>
+      </p:grpSp>
+      <p:grpSp>
+        <p:nvGrpSpPr>
+          <p:cNvPr id="21" name="Group 20">
+            <a:extLst>
+              <a:ext uri="{FF2B5EF4-FFF2-40B4-BE49-F238E27FC236}">
+                <a16:creationId xmlns:a16="http://schemas.microsoft.com/office/drawing/2014/main" id="{EFDC4611-ABF0-4313-BC79-1267E1A001B0}"/>
+              </a:ext>
+            </a:extLst>
+          </p:cNvPr>
+          <p:cNvGrpSpPr/>
+          <p:nvPr/>
+        </p:nvGrpSpPr>
+        <p:grpSpPr>
+          <a:xfrm>
+            <a:off x="5983849" y="2927419"/>
+            <a:ext cx="425520" cy="113040"/>
+            <a:chOff x="5983849" y="2927419"/>
+            <a:chExt cx="425520" cy="113040"/>
+          </a:xfrm>
+        </p:grpSpPr>
+        <mc:AlternateContent xmlns:mc="http://schemas.openxmlformats.org/markup-compatibility/2006">
+          <mc:Choice xmlns:p14="http://schemas.microsoft.com/office/powerpoint/2010/main" Requires="p14">
+            <p:contentPart p14:bwMode="auto" r:id="rId24">
+              <p14:nvContentPartPr>
+                <p14:cNvPr id="16" name="Ink 15">
+                  <a:extLst>
+                    <a:ext uri="{FF2B5EF4-FFF2-40B4-BE49-F238E27FC236}">
+                      <a16:creationId xmlns:a16="http://schemas.microsoft.com/office/drawing/2014/main" id="{A3F12FBC-95DC-4BD5-A90F-DC1983FB7382}"/>
+                    </a:ext>
+                  </a:extLst>
+                </p14:cNvPr>
+                <p14:cNvContentPartPr/>
+                <p14:nvPr/>
+              </p14:nvContentPartPr>
+              <p14:xfrm>
+                <a:off x="5983849" y="2927419"/>
+                <a:ext cx="77760" cy="110880"/>
+              </p14:xfrm>
+            </p:contentPart>
+          </mc:Choice>
+          <mc:Fallback>
+            <p:pic>
+              <p:nvPicPr>
+                <p:cNvPr id="16" name="Ink 15">
+                  <a:extLst>
+                    <a:ext uri="{FF2B5EF4-FFF2-40B4-BE49-F238E27FC236}">
+                      <a16:creationId xmlns:a16="http://schemas.microsoft.com/office/drawing/2014/main" id="{A3F12FBC-95DC-4BD5-A90F-DC1983FB7382}"/>
+                    </a:ext>
+                  </a:extLst>
+                </p:cNvPr>
+                <p:cNvPicPr/>
+                <p:nvPr/>
+              </p:nvPicPr>
+              <p:blipFill>
+                <a:blip r:embed="rId25"/>
+                <a:stretch>
+                  <a:fillRect/>
+                </a:stretch>
+              </p:blipFill>
+              <p:spPr>
+                <a:xfrm>
+                  <a:off x="5974849" y="2918419"/>
+                  <a:ext cx="95400" cy="128520"/>
+                </a:xfrm>
+                <a:prstGeom prst="rect">
+                  <a:avLst/>
+                </a:prstGeom>
+              </p:spPr>
+            </p:pic>
+          </mc:Fallback>
+        </mc:AlternateContent>
+        <mc:AlternateContent xmlns:mc="http://schemas.openxmlformats.org/markup-compatibility/2006">
+          <mc:Choice xmlns:p14="http://schemas.microsoft.com/office/powerpoint/2010/main" Requires="p14">
+            <p:contentPart p14:bwMode="auto" r:id="rId26">
+              <p14:nvContentPartPr>
+                <p14:cNvPr id="17" name="Ink 16">
+                  <a:extLst>
+                    <a:ext uri="{FF2B5EF4-FFF2-40B4-BE49-F238E27FC236}">
+                      <a16:creationId xmlns:a16="http://schemas.microsoft.com/office/drawing/2014/main" id="{B3D63855-931B-46BB-8D77-03E7E6FEEF5D}"/>
+                    </a:ext>
+                  </a:extLst>
+                </p14:cNvPr>
+                <p14:cNvContentPartPr/>
+                <p14:nvPr/>
+              </p14:nvContentPartPr>
+              <p14:xfrm>
+                <a:off x="6083209" y="2948299"/>
+                <a:ext cx="90000" cy="79560"/>
+              </p14:xfrm>
+            </p:contentPart>
+          </mc:Choice>
+          <mc:Fallback>
+            <p:pic>
+              <p:nvPicPr>
+                <p:cNvPr id="17" name="Ink 16">
+                  <a:extLst>
+                    <a:ext uri="{FF2B5EF4-FFF2-40B4-BE49-F238E27FC236}">
+                      <a16:creationId xmlns:a16="http://schemas.microsoft.com/office/drawing/2014/main" id="{B3D63855-931B-46BB-8D77-03E7E6FEEF5D}"/>
+                    </a:ext>
+                  </a:extLst>
+                </p:cNvPr>
+                <p:cNvPicPr/>
+                <p:nvPr/>
+              </p:nvPicPr>
+              <p:blipFill>
+                <a:blip r:embed="rId27"/>
+                <a:stretch>
+                  <a:fillRect/>
+                </a:stretch>
+              </p:blipFill>
+              <p:spPr>
+                <a:xfrm>
+                  <a:off x="6074209" y="2939299"/>
+                  <a:ext cx="107640" cy="97200"/>
+                </a:xfrm>
+                <a:prstGeom prst="rect">
+                  <a:avLst/>
+                </a:prstGeom>
+              </p:spPr>
+            </p:pic>
+          </mc:Fallback>
+        </mc:AlternateContent>
+        <mc:AlternateContent xmlns:mc="http://schemas.openxmlformats.org/markup-compatibility/2006">
+          <mc:Choice xmlns:p14="http://schemas.microsoft.com/office/powerpoint/2010/main" Requires="p14">
+            <p:contentPart p14:bwMode="auto" r:id="rId28">
+              <p14:nvContentPartPr>
+                <p14:cNvPr id="18" name="Ink 17">
+                  <a:extLst>
+                    <a:ext uri="{FF2B5EF4-FFF2-40B4-BE49-F238E27FC236}">
+                      <a16:creationId xmlns:a16="http://schemas.microsoft.com/office/drawing/2014/main" id="{7E9D14BE-0DDB-4961-BC3D-8269E4A1300D}"/>
+                    </a:ext>
+                  </a:extLst>
+                </p14:cNvPr>
+                <p14:cNvContentPartPr/>
+                <p14:nvPr/>
+              </p14:nvContentPartPr>
+              <p14:xfrm>
+                <a:off x="6093289" y="2949739"/>
+                <a:ext cx="93600" cy="90720"/>
+              </p14:xfrm>
+            </p:contentPart>
+          </mc:Choice>
+          <mc:Fallback>
+            <p:pic>
+              <p:nvPicPr>
+                <p:cNvPr id="18" name="Ink 17">
+                  <a:extLst>
+                    <a:ext uri="{FF2B5EF4-FFF2-40B4-BE49-F238E27FC236}">
+                      <a16:creationId xmlns:a16="http://schemas.microsoft.com/office/drawing/2014/main" id="{7E9D14BE-0DDB-4961-BC3D-8269E4A1300D}"/>
+                    </a:ext>
+                  </a:extLst>
+                </p:cNvPr>
+                <p:cNvPicPr/>
+                <p:nvPr/>
+              </p:nvPicPr>
+              <p:blipFill>
+                <a:blip r:embed="rId29"/>
+                <a:stretch>
+                  <a:fillRect/>
+                </a:stretch>
+              </p:blipFill>
+              <p:spPr>
+                <a:xfrm>
+                  <a:off x="6084649" y="2940739"/>
+                  <a:ext cx="111240" cy="108360"/>
+                </a:xfrm>
+                <a:prstGeom prst="rect">
+                  <a:avLst/>
+                </a:prstGeom>
+              </p:spPr>
+            </p:pic>
+          </mc:Fallback>
+        </mc:AlternateContent>
+        <mc:AlternateContent xmlns:mc="http://schemas.openxmlformats.org/markup-compatibility/2006">
+          <mc:Choice xmlns:p14="http://schemas.microsoft.com/office/powerpoint/2010/main" Requires="p14">
+            <p:contentPart p14:bwMode="auto" r:id="rId30">
+              <p14:nvContentPartPr>
+                <p14:cNvPr id="19" name="Ink 18">
+                  <a:extLst>
+                    <a:ext uri="{FF2B5EF4-FFF2-40B4-BE49-F238E27FC236}">
+                      <a16:creationId xmlns:a16="http://schemas.microsoft.com/office/drawing/2014/main" id="{F8E58830-CF8D-4DFF-84E3-211BF333A071}"/>
+                    </a:ext>
+                  </a:extLst>
+                </p14:cNvPr>
+                <p14:cNvContentPartPr/>
+                <p14:nvPr/>
+              </p14:nvContentPartPr>
+              <p14:xfrm>
+                <a:off x="6208489" y="2931739"/>
+                <a:ext cx="65880" cy="86400"/>
+              </p14:xfrm>
+            </p:contentPart>
+          </mc:Choice>
+          <mc:Fallback>
+            <p:pic>
+              <p:nvPicPr>
+                <p:cNvPr id="19" name="Ink 18">
+                  <a:extLst>
+                    <a:ext uri="{FF2B5EF4-FFF2-40B4-BE49-F238E27FC236}">
+                      <a16:creationId xmlns:a16="http://schemas.microsoft.com/office/drawing/2014/main" id="{F8E58830-CF8D-4DFF-84E3-211BF333A071}"/>
+                    </a:ext>
+                  </a:extLst>
+                </p:cNvPr>
+                <p:cNvPicPr/>
+                <p:nvPr/>
+              </p:nvPicPr>
+              <p:blipFill>
+                <a:blip r:embed="rId31"/>
+                <a:stretch>
+                  <a:fillRect/>
+                </a:stretch>
+              </p:blipFill>
+              <p:spPr>
+                <a:xfrm>
+                  <a:off x="6199849" y="2922739"/>
+                  <a:ext cx="83520" cy="104040"/>
+                </a:xfrm>
+                <a:prstGeom prst="rect">
+                  <a:avLst/>
+                </a:prstGeom>
+              </p:spPr>
+            </p:pic>
+          </mc:Fallback>
+        </mc:AlternateContent>
+        <mc:AlternateContent xmlns:mc="http://schemas.openxmlformats.org/markup-compatibility/2006">
+          <mc:Choice xmlns:p14="http://schemas.microsoft.com/office/powerpoint/2010/main" Requires="p14">
+            <p:contentPart p14:bwMode="auto" r:id="rId32">
+              <p14:nvContentPartPr>
+                <p14:cNvPr id="20" name="Ink 19">
+                  <a:extLst>
+                    <a:ext uri="{FF2B5EF4-FFF2-40B4-BE49-F238E27FC236}">
+                      <a16:creationId xmlns:a16="http://schemas.microsoft.com/office/drawing/2014/main" id="{8390715C-86A7-4FD2-B440-FCD911E7A59A}"/>
+                    </a:ext>
+                  </a:extLst>
+                </p14:cNvPr>
+                <p14:cNvContentPartPr/>
+                <p14:nvPr/>
+              </p14:nvContentPartPr>
+              <p14:xfrm>
+                <a:off x="6302809" y="2961259"/>
+                <a:ext cx="106560" cy="63000"/>
+              </p14:xfrm>
+            </p:contentPart>
+          </mc:Choice>
+          <mc:Fallback>
+            <p:pic>
+              <p:nvPicPr>
+                <p:cNvPr id="20" name="Ink 19">
+                  <a:extLst>
+                    <a:ext uri="{FF2B5EF4-FFF2-40B4-BE49-F238E27FC236}">
+                      <a16:creationId xmlns:a16="http://schemas.microsoft.com/office/drawing/2014/main" id="{8390715C-86A7-4FD2-B440-FCD911E7A59A}"/>
+                    </a:ext>
+                  </a:extLst>
+                </p:cNvPr>
+                <p:cNvPicPr/>
+                <p:nvPr/>
+              </p:nvPicPr>
+              <p:blipFill>
+                <a:blip r:embed="rId33"/>
+                <a:stretch>
+                  <a:fillRect/>
+                </a:stretch>
+              </p:blipFill>
+              <p:spPr>
+                <a:xfrm>
+                  <a:off x="6293809" y="2952259"/>
+                  <a:ext cx="124200" cy="80640"/>
+                </a:xfrm>
+                <a:prstGeom prst="rect">
+                  <a:avLst/>
+                </a:prstGeom>
+              </p:spPr>
+            </p:pic>
+          </mc:Fallback>
+        </mc:AlternateContent>
+      </p:grpSp>
+      <p:grpSp>
+        <p:nvGrpSpPr>
+          <p:cNvPr id="25" name="Group 24">
+            <a:extLst>
+              <a:ext uri="{FF2B5EF4-FFF2-40B4-BE49-F238E27FC236}">
+                <a16:creationId xmlns:a16="http://schemas.microsoft.com/office/drawing/2014/main" id="{CBEE6196-0D9C-497C-A700-A66FAE012EA2}"/>
+              </a:ext>
+            </a:extLst>
+          </p:cNvPr>
+          <p:cNvGrpSpPr/>
+          <p:nvPr/>
+        </p:nvGrpSpPr>
+        <p:grpSpPr>
+          <a:xfrm>
+            <a:off x="1205569" y="3972499"/>
+            <a:ext cx="164880" cy="785160"/>
+            <a:chOff x="1205569" y="3972499"/>
+            <a:chExt cx="164880" cy="785160"/>
+          </a:xfrm>
+        </p:grpSpPr>
+        <mc:AlternateContent xmlns:mc="http://schemas.openxmlformats.org/markup-compatibility/2006">
+          <mc:Choice xmlns:p14="http://schemas.microsoft.com/office/powerpoint/2010/main" Requires="p14">
+            <p:contentPart p14:bwMode="auto" r:id="rId34">
+              <p14:nvContentPartPr>
+                <p14:cNvPr id="23" name="Ink 22">
+                  <a:extLst>
+                    <a:ext uri="{FF2B5EF4-FFF2-40B4-BE49-F238E27FC236}">
+                      <a16:creationId xmlns:a16="http://schemas.microsoft.com/office/drawing/2014/main" id="{8B764084-037E-46ED-A365-8448EDB99CED}"/>
+                    </a:ext>
+                  </a:extLst>
+                </p14:cNvPr>
+                <p14:cNvContentPartPr/>
+                <p14:nvPr/>
+              </p14:nvContentPartPr>
+              <p14:xfrm>
+                <a:off x="1309969" y="3974299"/>
+                <a:ext cx="60480" cy="8640"/>
+              </p14:xfrm>
+            </p:contentPart>
+          </mc:Choice>
+          <mc:Fallback>
+            <p:pic>
+              <p:nvPicPr>
+                <p:cNvPr id="23" name="Ink 22">
+                  <a:extLst>
+                    <a:ext uri="{FF2B5EF4-FFF2-40B4-BE49-F238E27FC236}">
+                      <a16:creationId xmlns:a16="http://schemas.microsoft.com/office/drawing/2014/main" id="{8B764084-037E-46ED-A365-8448EDB99CED}"/>
+                    </a:ext>
+                  </a:extLst>
+                </p:cNvPr>
+                <p:cNvPicPr/>
+                <p:nvPr/>
+              </p:nvPicPr>
+              <p:blipFill>
+                <a:blip r:embed="rId35"/>
+                <a:stretch>
+                  <a:fillRect/>
+                </a:stretch>
+              </p:blipFill>
+              <p:spPr>
+                <a:xfrm>
+                  <a:off x="1300969" y="3965659"/>
+                  <a:ext cx="78120" cy="26280"/>
+                </a:xfrm>
+                <a:prstGeom prst="rect">
+                  <a:avLst/>
+                </a:prstGeom>
+              </p:spPr>
+            </p:pic>
+          </mc:Fallback>
+        </mc:AlternateContent>
+        <mc:AlternateContent xmlns:mc="http://schemas.openxmlformats.org/markup-compatibility/2006">
+          <mc:Choice xmlns:p14="http://schemas.microsoft.com/office/powerpoint/2010/main" Requires="p14">
+            <p:contentPart p14:bwMode="auto" r:id="rId36">
+              <p14:nvContentPartPr>
+                <p14:cNvPr id="24" name="Ink 23">
+                  <a:extLst>
+                    <a:ext uri="{FF2B5EF4-FFF2-40B4-BE49-F238E27FC236}">
+                      <a16:creationId xmlns:a16="http://schemas.microsoft.com/office/drawing/2014/main" id="{37778717-92B9-4AE4-A71B-3738C0D13DBB}"/>
+                    </a:ext>
+                  </a:extLst>
+                </p14:cNvPr>
+                <p14:cNvContentPartPr/>
+                <p14:nvPr/>
+              </p14:nvContentPartPr>
+              <p14:xfrm>
+                <a:off x="1205569" y="3972499"/>
+                <a:ext cx="149400" cy="785160"/>
+              </p14:xfrm>
+            </p:contentPart>
+          </mc:Choice>
+          <mc:Fallback>
+            <p:pic>
+              <p:nvPicPr>
+                <p:cNvPr id="24" name="Ink 23">
+                  <a:extLst>
+                    <a:ext uri="{FF2B5EF4-FFF2-40B4-BE49-F238E27FC236}">
+                      <a16:creationId xmlns:a16="http://schemas.microsoft.com/office/drawing/2014/main" id="{37778717-92B9-4AE4-A71B-3738C0D13DBB}"/>
+                    </a:ext>
+                  </a:extLst>
+                </p:cNvPr>
+                <p:cNvPicPr/>
+                <p:nvPr/>
+              </p:nvPicPr>
+              <p:blipFill>
+                <a:blip r:embed="rId37"/>
+                <a:stretch>
+                  <a:fillRect/>
+                </a:stretch>
+              </p:blipFill>
+              <p:spPr>
+                <a:xfrm>
+                  <a:off x="1196569" y="3963859"/>
+                  <a:ext cx="167040" cy="802800"/>
+                </a:xfrm>
+                <a:prstGeom prst="rect">
+                  <a:avLst/>
+                </a:prstGeom>
+              </p:spPr>
+            </p:pic>
+          </mc:Fallback>
+        </mc:AlternateContent>
+      </p:grpSp>
+      <mc:AlternateContent xmlns:mc="http://schemas.openxmlformats.org/markup-compatibility/2006">
+        <mc:Choice xmlns:p14="http://schemas.microsoft.com/office/powerpoint/2010/main" Requires="p14">
+          <p:contentPart p14:bwMode="auto" r:id="rId38">
+            <p14:nvContentPartPr>
+              <p14:cNvPr id="26" name="Ink 25">
+                <a:extLst>
+                  <a:ext uri="{FF2B5EF4-FFF2-40B4-BE49-F238E27FC236}">
+                    <a16:creationId xmlns:a16="http://schemas.microsoft.com/office/drawing/2014/main" id="{8A8E0B5B-BB33-4BE4-B625-3F534A39B6EA}"/>
+                  </a:ext>
+                </a:extLst>
+              </p14:cNvPr>
+              <p14:cNvContentPartPr/>
+              <p14:nvPr/>
+            </p14:nvContentPartPr>
+            <p14:xfrm>
+              <a:off x="1411129" y="3723019"/>
+              <a:ext cx="27720" cy="43920"/>
+            </p14:xfrm>
+          </p:contentPart>
+        </mc:Choice>
+        <mc:Fallback>
+          <p:pic>
+            <p:nvPicPr>
+              <p:cNvPr id="26" name="Ink 25">
+                <a:extLst>
+                  <a:ext uri="{FF2B5EF4-FFF2-40B4-BE49-F238E27FC236}">
+                    <a16:creationId xmlns:a16="http://schemas.microsoft.com/office/drawing/2014/main" id="{8A8E0B5B-BB33-4BE4-B625-3F534A39B6EA}"/>
+                  </a:ext>
+                </a:extLst>
+              </p:cNvPr>
+              <p:cNvPicPr/>
+              <p:nvPr/>
+            </p:nvPicPr>
+            <p:blipFill>
+              <a:blip r:embed="rId39"/>
+              <a:stretch>
+                <a:fillRect/>
+              </a:stretch>
+            </p:blipFill>
+            <p:spPr>
+              <a:xfrm>
+                <a:off x="1402489" y="3714379"/>
+                <a:ext cx="45360" cy="61560"/>
+              </a:xfrm>
+              <a:prstGeom prst="rect">
+                <a:avLst/>
+              </a:prstGeom>
+            </p:spPr>
+          </p:pic>
+        </mc:Fallback>
+      </mc:AlternateContent>
+      <mc:AlternateContent xmlns:mc="http://schemas.openxmlformats.org/markup-compatibility/2006">
+        <mc:Choice xmlns:p14="http://schemas.microsoft.com/office/powerpoint/2010/main" Requires="p14">
+          <p:contentPart p14:bwMode="auto" r:id="rId40">
+            <p14:nvContentPartPr>
+              <p14:cNvPr id="27" name="Ink 26">
+                <a:extLst>
+                  <a:ext uri="{FF2B5EF4-FFF2-40B4-BE49-F238E27FC236}">
+                    <a16:creationId xmlns:a16="http://schemas.microsoft.com/office/drawing/2014/main" id="{947A788D-9640-4BDB-811C-BA2B3C690336}"/>
+                  </a:ext>
+                </a:extLst>
+              </p14:cNvPr>
+              <p14:cNvContentPartPr/>
+              <p14:nvPr/>
+            </p14:nvContentPartPr>
+            <p14:xfrm>
+              <a:off x="726769" y="4272739"/>
+              <a:ext cx="280440" cy="141840"/>
+            </p14:xfrm>
+          </p:contentPart>
+        </mc:Choice>
+        <mc:Fallback>
+          <p:pic>
+            <p:nvPicPr>
+              <p:cNvPr id="27" name="Ink 26">
+                <a:extLst>
+                  <a:ext uri="{FF2B5EF4-FFF2-40B4-BE49-F238E27FC236}">
+                    <a16:creationId xmlns:a16="http://schemas.microsoft.com/office/drawing/2014/main" id="{947A788D-9640-4BDB-811C-BA2B3C690336}"/>
+                  </a:ext>
+                </a:extLst>
+              </p:cNvPr>
+              <p:cNvPicPr/>
+              <p:nvPr/>
+            </p:nvPicPr>
+            <p:blipFill>
+              <a:blip r:embed="rId41"/>
+              <a:stretch>
+                <a:fillRect/>
+              </a:stretch>
+            </p:blipFill>
+            <p:spPr>
+              <a:xfrm>
+                <a:off x="717769" y="4264099"/>
+                <a:ext cx="298080" cy="159480"/>
+              </a:xfrm>
+              <a:prstGeom prst="rect">
+                <a:avLst/>
+              </a:prstGeom>
+            </p:spPr>
+          </p:pic>
+        </mc:Fallback>
+      </mc:AlternateContent>
     </p:spTree>
     <p:extLst>
       <p:ext uri="{BB962C8B-B14F-4D97-AF65-F5344CB8AC3E}">
@@ -4331,6 +6107,57 @@
           </a:p>
         </p:txBody>
       </p:sp>
+      <mc:AlternateContent xmlns:mc="http://schemas.openxmlformats.org/markup-compatibility/2006">
+        <mc:Choice xmlns:p14="http://schemas.microsoft.com/office/powerpoint/2010/main" Requires="p14">
+          <p:contentPart p14:bwMode="auto" r:id="rId2">
+            <p14:nvContentPartPr>
+              <p14:cNvPr id="4" name="Ink 3">
+                <a:extLst>
+                  <a:ext uri="{FF2B5EF4-FFF2-40B4-BE49-F238E27FC236}">
+                    <a16:creationId xmlns:a16="http://schemas.microsoft.com/office/drawing/2014/main" id="{EEE9FF2A-3CB0-4DF3-9A7C-119536DEC2E3}"/>
+                  </a:ext>
+                </a:extLst>
+              </p14:cNvPr>
+              <p14:cNvContentPartPr/>
+              <p14:nvPr/>
+            </p14:nvContentPartPr>
+            <p14:xfrm>
+              <a:off x="933769" y="1736179"/>
+              <a:ext cx="1706400" cy="50400"/>
+            </p14:xfrm>
+          </p:contentPart>
+        </mc:Choice>
+        <mc:Fallback>
+          <p:pic>
+            <p:nvPicPr>
+              <p:cNvPr id="4" name="Ink 3">
+                <a:extLst>
+                  <a:ext uri="{FF2B5EF4-FFF2-40B4-BE49-F238E27FC236}">
+                    <a16:creationId xmlns:a16="http://schemas.microsoft.com/office/drawing/2014/main" id="{EEE9FF2A-3CB0-4DF3-9A7C-119536DEC2E3}"/>
+                  </a:ext>
+                </a:extLst>
+              </p:cNvPr>
+              <p:cNvPicPr/>
+              <p:nvPr/>
+            </p:nvPicPr>
+            <p:blipFill>
+              <a:blip r:embed="rId3"/>
+              <a:stretch>
+                <a:fillRect/>
+              </a:stretch>
+            </p:blipFill>
+            <p:spPr>
+              <a:xfrm>
+                <a:off x="924769" y="1727539"/>
+                <a:ext cx="1724040" cy="68040"/>
+              </a:xfrm>
+              <a:prstGeom prst="rect">
+                <a:avLst/>
+              </a:prstGeom>
+            </p:spPr>
+          </p:pic>
+        </mc:Fallback>
+      </mc:AlternateContent>
     </p:spTree>
     <p:extLst>
       <p:ext uri="{BB962C8B-B14F-4D97-AF65-F5344CB8AC3E}">

</xml_diff>